<commit_message>
removed useless demo, updated slides
</commit_message>
<xml_diff>
--- a/java8function/docs/Java8 function.pptx
+++ b/java8function/docs/Java8 function.pptx
@@ -5,37 +5,38 @@
     <p:sldMasterId id="2147483648" r:id="rId1"/>
   </p:sldMasterIdLst>
   <p:notesMasterIdLst>
-    <p:notesMasterId r:id="rId4"/>
+    <p:notesMasterId r:id="rId31"/>
   </p:notesMasterIdLst>
   <p:sldIdLst>
-    <p:sldId id="256" r:id="rId3"/>
-    <p:sldId id="257" r:id="rId5"/>
-    <p:sldId id="258" r:id="rId6"/>
-    <p:sldId id="259" r:id="rId7"/>
-    <p:sldId id="260" r:id="rId8"/>
-    <p:sldId id="261" r:id="rId9"/>
-    <p:sldId id="262" r:id="rId10"/>
-    <p:sldId id="263" r:id="rId11"/>
-    <p:sldId id="264" r:id="rId12"/>
-    <p:sldId id="265" r:id="rId13"/>
-    <p:sldId id="266" r:id="rId14"/>
-    <p:sldId id="267" r:id="rId15"/>
-    <p:sldId id="268" r:id="rId16"/>
-    <p:sldId id="269" r:id="rId17"/>
-    <p:sldId id="270" r:id="rId18"/>
-    <p:sldId id="271" r:id="rId19"/>
-    <p:sldId id="274" r:id="rId20"/>
-    <p:sldId id="275" r:id="rId21"/>
-    <p:sldId id="276" r:id="rId22"/>
-    <p:sldId id="277" r:id="rId23"/>
-    <p:sldId id="278" r:id="rId24"/>
-    <p:sldId id="280" r:id="rId25"/>
-    <p:sldId id="281" r:id="rId26"/>
-    <p:sldId id="282" r:id="rId27"/>
-    <p:sldId id="283" r:id="rId28"/>
-    <p:sldId id="284" r:id="rId29"/>
-    <p:sldId id="285" r:id="rId30"/>
-    <p:sldId id="286" r:id="rId31"/>
+    <p:sldId id="256" r:id="rId2"/>
+    <p:sldId id="287" r:id="rId3"/>
+    <p:sldId id="257" r:id="rId4"/>
+    <p:sldId id="258" r:id="rId5"/>
+    <p:sldId id="259" r:id="rId6"/>
+    <p:sldId id="260" r:id="rId7"/>
+    <p:sldId id="261" r:id="rId8"/>
+    <p:sldId id="262" r:id="rId9"/>
+    <p:sldId id="263" r:id="rId10"/>
+    <p:sldId id="264" r:id="rId11"/>
+    <p:sldId id="265" r:id="rId12"/>
+    <p:sldId id="266" r:id="rId13"/>
+    <p:sldId id="267" r:id="rId14"/>
+    <p:sldId id="268" r:id="rId15"/>
+    <p:sldId id="269" r:id="rId16"/>
+    <p:sldId id="270" r:id="rId17"/>
+    <p:sldId id="271" r:id="rId18"/>
+    <p:sldId id="274" r:id="rId19"/>
+    <p:sldId id="275" r:id="rId20"/>
+    <p:sldId id="276" r:id="rId21"/>
+    <p:sldId id="277" r:id="rId22"/>
+    <p:sldId id="278" r:id="rId23"/>
+    <p:sldId id="280" r:id="rId24"/>
+    <p:sldId id="281" r:id="rId25"/>
+    <p:sldId id="282" r:id="rId26"/>
+    <p:sldId id="283" r:id="rId27"/>
+    <p:sldId id="284" r:id="rId28"/>
+    <p:sldId id="285" r:id="rId29"/>
+    <p:sldId id="286" r:id="rId30"/>
   </p:sldIdLst>
   <p:sldSz cx="12192000" cy="6858000"/>
   <p:notesSz cx="6858000" cy="9144000"/>
@@ -142,6 +143,11 @@
             <p14:sldId id="256"/>
           </p14:sldIdLst>
         </p14:section>
+        <p14:section name="Lambda" id="{53F079CC-FD36-424D-A0B7-4BB4073BF8ED}">
+          <p14:sldIdLst>
+            <p14:sldId id="287"/>
+          </p14:sldIdLst>
+        </p14:section>
         <p14:section name="Advantage Funcation Paradigm" id="{F8B3F1BD-FB6F-4C47-A404-97E8FB11DA05}">
           <p14:sldIdLst>
             <p14:sldId id="257"/>
@@ -177,15 +183,18 @@
         <p14:section name="Stream interface methods" id="{28A88A0E-CEBC-4856-9895-3E871FEB6394}">
           <p14:sldIdLst>
             <p14:sldId id="280"/>
+            <p14:sldId id="281"/>
             <p14:sldId id="282"/>
             <p14:sldId id="283"/>
             <p14:sldId id="284"/>
             <p14:sldId id="285"/>
             <p14:sldId id="286"/>
-            <p14:sldId id="281"/>
           </p14:sldIdLst>
         </p14:section>
       </p14:sectionLst>
+    </p:ext>
+    <p:ext uri="{EFAFB233-063F-42B5-8137-9DF3F51BA10A}">
+      <p15:sldGuideLst xmlns:p15="http://schemas.microsoft.com/office/powerpoint/2012/main"/>
     </p:ext>
   </p:extLst>
 </p:presentation>
@@ -273,6 +282,7 @@
           <a:p>
             <a:fld id="{6FEF79D9-4720-4EC0-85DC-E96B1906CE70}" type="datetimeFigureOut">
               <a:rPr lang="zh-CN" altLang="en-US" smtClean="0"/>
+              <a:t>2019/2/26</a:t>
             </a:fld>
             <a:endParaRPr lang="zh-CN" altLang="en-US"/>
           </a:p>
@@ -339,7 +349,6 @@
               <a:rPr lang="zh-CN" altLang="en-US" smtClean="0"/>
               <a:t>单击此处编辑母版文本样式</a:t>
             </a:r>
-            <a:endParaRPr lang="zh-CN" altLang="en-US" smtClean="0"/>
           </a:p>
           <a:p>
             <a:pPr lvl="1"/>
@@ -347,7 +356,6 @@
               <a:rPr lang="zh-CN" altLang="en-US" smtClean="0"/>
               <a:t>第二级</a:t>
             </a:r>
-            <a:endParaRPr lang="zh-CN" altLang="en-US" smtClean="0"/>
           </a:p>
           <a:p>
             <a:pPr lvl="2"/>
@@ -355,7 +363,6 @@
               <a:rPr lang="zh-CN" altLang="en-US" smtClean="0"/>
               <a:t>第三级</a:t>
             </a:r>
-            <a:endParaRPr lang="zh-CN" altLang="en-US" smtClean="0"/>
           </a:p>
           <a:p>
             <a:pPr lvl="3"/>
@@ -363,7 +370,6 @@
               <a:rPr lang="zh-CN" altLang="en-US" smtClean="0"/>
               <a:t>第四级</a:t>
             </a:r>
-            <a:endParaRPr lang="zh-CN" altLang="en-US" smtClean="0"/>
           </a:p>
           <a:p>
             <a:pPr lvl="4"/>
@@ -435,12 +441,18 @@
           <a:p>
             <a:fld id="{2C329D24-007F-4862-846C-36458EBA28E1}" type="slidenum">
               <a:rPr lang="zh-CN" altLang="en-US" smtClean="0"/>
+              <a:t>‹#›</a:t>
             </a:fld>
             <a:endParaRPr lang="zh-CN" altLang="en-US"/>
           </a:p>
         </p:txBody>
       </p:sp>
     </p:spTree>
+    <p:extLst>
+      <p:ext uri="{BB962C8B-B14F-4D97-AF65-F5344CB8AC3E}">
+        <p14:creationId xmlns:p14="http://schemas.microsoft.com/office/powerpoint/2010/main" val="398182884"/>
+      </p:ext>
+    </p:extLst>
   </p:cSld>
   <p:clrMap bg1="lt1" tx1="dk1" bg2="lt2" tx2="dk2" accent1="accent1" accent2="accent2" accent3="accent3" accent4="accent4" accent5="accent5" accent6="accent6" hlink="hlink" folHlink="folHlink"/>
   <p:notesStyle>
@@ -607,12 +619,18 @@
           <a:p>
             <a:fld id="{2C329D24-007F-4862-846C-36458EBA28E1}" type="slidenum">
               <a:rPr lang="zh-CN" altLang="en-US" smtClean="0"/>
+              <a:t>1</a:t>
             </a:fld>
             <a:endParaRPr lang="zh-CN" altLang="en-US"/>
           </a:p>
         </p:txBody>
       </p:sp>
     </p:spTree>
+    <p:extLst>
+      <p:ext uri="{BB962C8B-B14F-4D97-AF65-F5344CB8AC3E}">
+        <p14:creationId xmlns:p14="http://schemas.microsoft.com/office/powerpoint/2010/main" val="3014472593"/>
+      </p:ext>
+    </p:extLst>
   </p:cSld>
   <p:clrMapOvr>
     <a:masterClrMapping/>
@@ -685,12 +703,18 @@
           <a:p>
             <a:fld id="{2C329D24-007F-4862-846C-36458EBA28E1}" type="slidenum">
               <a:rPr lang="zh-CN" altLang="en-US" smtClean="0"/>
+              <a:t>14</a:t>
             </a:fld>
             <a:endParaRPr lang="zh-CN" altLang="en-US"/>
           </a:p>
         </p:txBody>
       </p:sp>
     </p:spTree>
+    <p:extLst>
+      <p:ext uri="{BB962C8B-B14F-4D97-AF65-F5344CB8AC3E}">
+        <p14:creationId xmlns:p14="http://schemas.microsoft.com/office/powerpoint/2010/main" val="1871378568"/>
+      </p:ext>
+    </p:extLst>
   </p:cSld>
   <p:clrMapOvr>
     <a:masterClrMapping/>
@@ -763,12 +787,18 @@
           <a:p>
             <a:fld id="{2C329D24-007F-4862-846C-36458EBA28E1}" type="slidenum">
               <a:rPr lang="zh-CN" altLang="en-US" smtClean="0"/>
+              <a:t>16</a:t>
             </a:fld>
             <a:endParaRPr lang="zh-CN" altLang="en-US"/>
           </a:p>
         </p:txBody>
       </p:sp>
     </p:spTree>
+    <p:extLst>
+      <p:ext uri="{BB962C8B-B14F-4D97-AF65-F5344CB8AC3E}">
+        <p14:creationId xmlns:p14="http://schemas.microsoft.com/office/powerpoint/2010/main" val="3038799554"/>
+      </p:ext>
+    </p:extLst>
   </p:cSld>
   <p:clrMapOvr>
     <a:masterClrMapping/>
@@ -841,12 +871,18 @@
           <a:p>
             <a:fld id="{2C329D24-007F-4862-846C-36458EBA28E1}" type="slidenum">
               <a:rPr lang="zh-CN" altLang="en-US" smtClean="0"/>
+              <a:t>17</a:t>
             </a:fld>
             <a:endParaRPr lang="zh-CN" altLang="en-US"/>
           </a:p>
         </p:txBody>
       </p:sp>
     </p:spTree>
+    <p:extLst>
+      <p:ext uri="{BB962C8B-B14F-4D97-AF65-F5344CB8AC3E}">
+        <p14:creationId xmlns:p14="http://schemas.microsoft.com/office/powerpoint/2010/main" val="2263849385"/>
+      </p:ext>
+    </p:extLst>
   </p:cSld>
   <p:clrMapOvr>
     <a:masterClrMapping/>
@@ -919,12 +955,18 @@
           <a:p>
             <a:fld id="{2C329D24-007F-4862-846C-36458EBA28E1}" type="slidenum">
               <a:rPr lang="zh-CN" altLang="en-US" smtClean="0"/>
+              <a:t>19</a:t>
             </a:fld>
             <a:endParaRPr lang="zh-CN" altLang="en-US"/>
           </a:p>
         </p:txBody>
       </p:sp>
     </p:spTree>
+    <p:extLst>
+      <p:ext uri="{BB962C8B-B14F-4D97-AF65-F5344CB8AC3E}">
+        <p14:creationId xmlns:p14="http://schemas.microsoft.com/office/powerpoint/2010/main" val="3851442487"/>
+      </p:ext>
+    </p:extLst>
   </p:cSld>
   <p:clrMapOvr>
     <a:masterClrMapping/>
@@ -997,12 +1039,18 @@
           <a:p>
             <a:fld id="{2C329D24-007F-4862-846C-36458EBA28E1}" type="slidenum">
               <a:rPr lang="zh-CN" altLang="en-US" smtClean="0"/>
+              <a:t>20</a:t>
             </a:fld>
             <a:endParaRPr lang="zh-CN" altLang="en-US"/>
           </a:p>
         </p:txBody>
       </p:sp>
     </p:spTree>
+    <p:extLst>
+      <p:ext uri="{BB962C8B-B14F-4D97-AF65-F5344CB8AC3E}">
+        <p14:creationId xmlns:p14="http://schemas.microsoft.com/office/powerpoint/2010/main" val="718214992"/>
+      </p:ext>
+    </p:extLst>
   </p:cSld>
   <p:clrMapOvr>
     <a:masterClrMapping/>
@@ -1075,12 +1123,18 @@
           <a:p>
             <a:fld id="{2C329D24-007F-4862-846C-36458EBA28E1}" type="slidenum">
               <a:rPr lang="zh-CN" altLang="en-US" smtClean="0"/>
+              <a:t>22</a:t>
             </a:fld>
             <a:endParaRPr lang="zh-CN" altLang="en-US"/>
           </a:p>
         </p:txBody>
       </p:sp>
     </p:spTree>
+    <p:extLst>
+      <p:ext uri="{BB962C8B-B14F-4D97-AF65-F5344CB8AC3E}">
+        <p14:creationId xmlns:p14="http://schemas.microsoft.com/office/powerpoint/2010/main" val="3859061091"/>
+      </p:ext>
+    </p:extLst>
   </p:cSld>
   <p:clrMapOvr>
     <a:masterClrMapping/>
@@ -1153,12 +1207,18 @@
           <a:p>
             <a:fld id="{2C329D24-007F-4862-846C-36458EBA28E1}" type="slidenum">
               <a:rPr lang="zh-CN" altLang="en-US" smtClean="0"/>
+              <a:t>23</a:t>
             </a:fld>
             <a:endParaRPr lang="zh-CN" altLang="en-US"/>
           </a:p>
         </p:txBody>
       </p:sp>
     </p:spTree>
+    <p:extLst>
+      <p:ext uri="{BB962C8B-B14F-4D97-AF65-F5344CB8AC3E}">
+        <p14:creationId xmlns:p14="http://schemas.microsoft.com/office/powerpoint/2010/main" val="102416647"/>
+      </p:ext>
+    </p:extLst>
   </p:cSld>
   <p:clrMapOvr>
     <a:masterClrMapping/>
@@ -1231,12 +1291,18 @@
           <a:p>
             <a:fld id="{2C329D24-007F-4862-846C-36458EBA28E1}" type="slidenum">
               <a:rPr lang="zh-CN" altLang="en-US" smtClean="0"/>
+              <a:t>24</a:t>
             </a:fld>
             <a:endParaRPr lang="zh-CN" altLang="en-US"/>
           </a:p>
         </p:txBody>
       </p:sp>
     </p:spTree>
+    <p:extLst>
+      <p:ext uri="{BB962C8B-B14F-4D97-AF65-F5344CB8AC3E}">
+        <p14:creationId xmlns:p14="http://schemas.microsoft.com/office/powerpoint/2010/main" val="1753501826"/>
+      </p:ext>
+    </p:extLst>
   </p:cSld>
   <p:clrMapOvr>
     <a:masterClrMapping/>
@@ -1309,12 +1375,18 @@
           <a:p>
             <a:fld id="{2C329D24-007F-4862-846C-36458EBA28E1}" type="slidenum">
               <a:rPr lang="zh-CN" altLang="en-US" smtClean="0"/>
+              <a:t>25</a:t>
             </a:fld>
             <a:endParaRPr lang="zh-CN" altLang="en-US"/>
           </a:p>
         </p:txBody>
       </p:sp>
     </p:spTree>
+    <p:extLst>
+      <p:ext uri="{BB962C8B-B14F-4D97-AF65-F5344CB8AC3E}">
+        <p14:creationId xmlns:p14="http://schemas.microsoft.com/office/powerpoint/2010/main" val="1925707677"/>
+      </p:ext>
+    </p:extLst>
   </p:cSld>
   <p:clrMapOvr>
     <a:masterClrMapping/>
@@ -1490,12 +1562,18 @@
           <a:p>
             <a:fld id="{2C329D24-007F-4862-846C-36458EBA28E1}" type="slidenum">
               <a:rPr lang="zh-CN" altLang="en-US" smtClean="0"/>
+              <a:t>26</a:t>
             </a:fld>
             <a:endParaRPr lang="zh-CN" altLang="en-US"/>
           </a:p>
         </p:txBody>
       </p:sp>
     </p:spTree>
+    <p:extLst>
+      <p:ext uri="{BB962C8B-B14F-4D97-AF65-F5344CB8AC3E}">
+        <p14:creationId xmlns:p14="http://schemas.microsoft.com/office/powerpoint/2010/main" val="1955431487"/>
+      </p:ext>
+    </p:extLst>
   </p:cSld>
   <p:clrMapOvr>
     <a:masterClrMapping/>
@@ -1572,12 +1650,18 @@
           <a:p>
             <a:fld id="{2C329D24-007F-4862-846C-36458EBA28E1}" type="slidenum">
               <a:rPr lang="zh-CN" altLang="en-US" smtClean="0"/>
+              <a:t>3</a:t>
             </a:fld>
             <a:endParaRPr lang="zh-CN" altLang="en-US"/>
           </a:p>
         </p:txBody>
       </p:sp>
     </p:spTree>
+    <p:extLst>
+      <p:ext uri="{BB962C8B-B14F-4D97-AF65-F5344CB8AC3E}">
+        <p14:creationId xmlns:p14="http://schemas.microsoft.com/office/powerpoint/2010/main" val="910913933"/>
+      </p:ext>
+    </p:extLst>
   </p:cSld>
   <p:clrMapOvr>
     <a:masterClrMapping/>
@@ -1650,12 +1734,18 @@
           <a:p>
             <a:fld id="{2C329D24-007F-4862-846C-36458EBA28E1}" type="slidenum">
               <a:rPr lang="zh-CN" altLang="en-US" smtClean="0"/>
+              <a:t>27</a:t>
             </a:fld>
             <a:endParaRPr lang="zh-CN" altLang="en-US"/>
           </a:p>
         </p:txBody>
       </p:sp>
     </p:spTree>
+    <p:extLst>
+      <p:ext uri="{BB962C8B-B14F-4D97-AF65-F5344CB8AC3E}">
+        <p14:creationId xmlns:p14="http://schemas.microsoft.com/office/powerpoint/2010/main" val="2854657821"/>
+      </p:ext>
+    </p:extLst>
   </p:cSld>
   <p:clrMapOvr>
     <a:masterClrMapping/>
@@ -1672,11 +1762,20 @@
         <p:cNvGrpSpPr/>
         <p:nvPr/>
       </p:nvGrpSpPr>
-      <p:grpSpPr/>
+      <p:grpSpPr>
+        <a:xfrm>
+          <a:off x="0" y="0"/>
+          <a:ext cx="0" cy="0"/>
+          <a:chOff x="0" y="0"/>
+          <a:chExt cx="0" cy="0"/>
+        </a:xfrm>
+      </p:grpSpPr>
       <p:sp>
         <p:nvSpPr>
           <p:cNvPr id="2" name="幻灯片图像占位符 1"/>
-          <p:cNvSpPr/>
+          <p:cNvSpPr>
+            <a:spLocks noGrp="1" noRot="1" noChangeAspect="1"/>
+          </p:cNvSpPr>
           <p:nvPr>
             <p:ph type="sldImg" idx="2"/>
           </p:nvPr>
@@ -1686,7 +1785,9 @@
       <p:sp>
         <p:nvSpPr>
           <p:cNvPr id="3" name="文本占位符 2"/>
-          <p:cNvSpPr/>
+          <p:cNvSpPr>
+            <a:spLocks noGrp="1"/>
+          </p:cNvSpPr>
           <p:nvPr>
             <p:ph type="body" idx="3"/>
           </p:nvPr>
@@ -1694,12 +1795,18 @@
         <p:spPr/>
         <p:txBody>
           <a:bodyPr/>
+          <a:lstStyle/>
           <a:p>
             <a:endParaRPr lang="zh-CN" altLang="en-US"/>
           </a:p>
         </p:txBody>
       </p:sp>
     </p:spTree>
+    <p:extLst>
+      <p:ext uri="{BB962C8B-B14F-4D97-AF65-F5344CB8AC3E}">
+        <p14:creationId xmlns:p14="http://schemas.microsoft.com/office/powerpoint/2010/main" val="2201462683"/>
+      </p:ext>
+    </p:extLst>
   </p:cSld>
   <p:clrMapOvr>
     <a:masterClrMapping/>
@@ -1755,7 +1862,6 @@
               <a:rPr lang="en-US" altLang="zh-CN" dirty="0" smtClean="0"/>
               <a:t>OCP- Open close principle</a:t>
             </a:r>
-            <a:endParaRPr lang="en-US" altLang="zh-CN" dirty="0" smtClean="0"/>
           </a:p>
           <a:p>
             <a:r>
@@ -1766,14 +1872,12 @@
               <a:rPr lang="en-US" altLang="zh-CN" baseline="0" dirty="0" smtClean="0"/>
               <a:t> – Interface segregation principle</a:t>
             </a:r>
-            <a:endParaRPr lang="en-US" altLang="zh-CN" baseline="0" dirty="0" smtClean="0"/>
           </a:p>
           <a:p>
             <a:r>
               <a:rPr lang="en-US" altLang="zh-CN" baseline="0" dirty="0" smtClean="0"/>
               <a:t>CARP - Composition aggregation reuse principle</a:t>
             </a:r>
-            <a:endParaRPr lang="en-US" altLang="zh-CN" baseline="0" dirty="0" smtClean="0"/>
           </a:p>
           <a:p>
             <a:r>
@@ -1788,7 +1892,6 @@
               <a:rPr lang="en-US" altLang="zh-CN" baseline="0" dirty="0" smtClean="0"/>
               <a:t> substitution principle</a:t>
             </a:r>
-            <a:endParaRPr lang="en-US" altLang="zh-CN" baseline="0" dirty="0" smtClean="0"/>
           </a:p>
           <a:p>
             <a:r>
@@ -1799,21 +1902,18 @@
               <a:rPr lang="en-US" altLang="zh-CN" baseline="0" dirty="0" smtClean="0"/>
               <a:t> -  Law of Demeter</a:t>
             </a:r>
-            <a:endParaRPr lang="en-US" altLang="zh-CN" baseline="0" dirty="0" smtClean="0"/>
           </a:p>
           <a:p>
             <a:r>
               <a:rPr lang="en-US" altLang="zh-CN" baseline="0" dirty="0" smtClean="0"/>
               <a:t>SRP - Single responsibility principle</a:t>
             </a:r>
-            <a:endParaRPr lang="en-US" altLang="zh-CN" baseline="0" dirty="0" smtClean="0"/>
           </a:p>
           <a:p>
             <a:r>
               <a:rPr lang="en-US" altLang="zh-CN" baseline="0" dirty="0" smtClean="0"/>
               <a:t>DIP – Dependency Inversion principle</a:t>
             </a:r>
-            <a:endParaRPr lang="en-US" altLang="zh-CN" baseline="0" dirty="0" smtClean="0"/>
           </a:p>
           <a:p>
             <a:endParaRPr lang="en-US" altLang="zh-CN" baseline="0" dirty="0" smtClean="0"/>
@@ -1847,12 +1947,18 @@
           <a:p>
             <a:fld id="{2C329D24-007F-4862-846C-36458EBA28E1}" type="slidenum">
               <a:rPr lang="zh-CN" altLang="en-US" smtClean="0"/>
+              <a:t>4</a:t>
             </a:fld>
             <a:endParaRPr lang="zh-CN" altLang="en-US"/>
           </a:p>
         </p:txBody>
       </p:sp>
     </p:spTree>
+    <p:extLst>
+      <p:ext uri="{BB962C8B-B14F-4D97-AF65-F5344CB8AC3E}">
+        <p14:creationId xmlns:p14="http://schemas.microsoft.com/office/powerpoint/2010/main" val="1394835242"/>
+      </p:ext>
+    </p:extLst>
   </p:cSld>
   <p:clrMapOvr>
     <a:masterClrMapping/>
@@ -1929,12 +2035,18 @@
           <a:p>
             <a:fld id="{2C329D24-007F-4862-846C-36458EBA28E1}" type="slidenum">
               <a:rPr lang="zh-CN" altLang="en-US" smtClean="0"/>
+              <a:t>7</a:t>
             </a:fld>
             <a:endParaRPr lang="zh-CN" altLang="en-US"/>
           </a:p>
         </p:txBody>
       </p:sp>
     </p:spTree>
+    <p:extLst>
+      <p:ext uri="{BB962C8B-B14F-4D97-AF65-F5344CB8AC3E}">
+        <p14:creationId xmlns:p14="http://schemas.microsoft.com/office/powerpoint/2010/main" val="931058695"/>
+      </p:ext>
+    </p:extLst>
   </p:cSld>
   <p:clrMapOvr>
     <a:masterClrMapping/>
@@ -2030,12 +2142,18 @@
           <a:p>
             <a:fld id="{2C329D24-007F-4862-846C-36458EBA28E1}" type="slidenum">
               <a:rPr lang="zh-CN" altLang="en-US" smtClean="0"/>
+              <a:t>8</a:t>
             </a:fld>
             <a:endParaRPr lang="zh-CN" altLang="en-US"/>
           </a:p>
         </p:txBody>
       </p:sp>
     </p:spTree>
+    <p:extLst>
+      <p:ext uri="{BB962C8B-B14F-4D97-AF65-F5344CB8AC3E}">
+        <p14:creationId xmlns:p14="http://schemas.microsoft.com/office/powerpoint/2010/main" val="2630917931"/>
+      </p:ext>
+    </p:extLst>
   </p:cSld>
   <p:clrMapOvr>
     <a:masterClrMapping/>
@@ -2258,12 +2376,18 @@
           <a:p>
             <a:fld id="{2C329D24-007F-4862-846C-36458EBA28E1}" type="slidenum">
               <a:rPr lang="zh-CN" altLang="en-US" smtClean="0"/>
+              <a:t>9</a:t>
             </a:fld>
             <a:endParaRPr lang="zh-CN" altLang="en-US"/>
           </a:p>
         </p:txBody>
       </p:sp>
     </p:spTree>
+    <p:extLst>
+      <p:ext uri="{BB962C8B-B14F-4D97-AF65-F5344CB8AC3E}">
+        <p14:creationId xmlns:p14="http://schemas.microsoft.com/office/powerpoint/2010/main" val="519515345"/>
+      </p:ext>
+    </p:extLst>
   </p:cSld>
   <p:clrMapOvr>
     <a:masterClrMapping/>
@@ -2336,12 +2460,18 @@
           <a:p>
             <a:fld id="{2C329D24-007F-4862-846C-36458EBA28E1}" type="slidenum">
               <a:rPr lang="zh-CN" altLang="en-US" smtClean="0"/>
+              <a:t>10</a:t>
             </a:fld>
             <a:endParaRPr lang="zh-CN" altLang="en-US"/>
           </a:p>
         </p:txBody>
       </p:sp>
     </p:spTree>
+    <p:extLst>
+      <p:ext uri="{BB962C8B-B14F-4D97-AF65-F5344CB8AC3E}">
+        <p14:creationId xmlns:p14="http://schemas.microsoft.com/office/powerpoint/2010/main" val="1062718605"/>
+      </p:ext>
+    </p:extLst>
   </p:cSld>
   <p:clrMapOvr>
     <a:masterClrMapping/>
@@ -2414,12 +2544,18 @@
           <a:p>
             <a:fld id="{2C329D24-007F-4862-846C-36458EBA28E1}" type="slidenum">
               <a:rPr lang="zh-CN" altLang="en-US" smtClean="0"/>
+              <a:t>12</a:t>
             </a:fld>
             <a:endParaRPr lang="zh-CN" altLang="en-US"/>
           </a:p>
         </p:txBody>
       </p:sp>
     </p:spTree>
+    <p:extLst>
+      <p:ext uri="{BB962C8B-B14F-4D97-AF65-F5344CB8AC3E}">
+        <p14:creationId xmlns:p14="http://schemas.microsoft.com/office/powerpoint/2010/main" val="3121165343"/>
+      </p:ext>
+    </p:extLst>
   </p:cSld>
   <p:clrMapOvr>
     <a:masterClrMapping/>
@@ -2492,12 +2628,18 @@
           <a:p>
             <a:fld id="{2C329D24-007F-4862-846C-36458EBA28E1}" type="slidenum">
               <a:rPr lang="zh-CN" altLang="en-US" smtClean="0"/>
+              <a:t>13</a:t>
             </a:fld>
             <a:endParaRPr lang="zh-CN" altLang="en-US"/>
           </a:p>
         </p:txBody>
       </p:sp>
     </p:spTree>
+    <p:extLst>
+      <p:ext uri="{BB962C8B-B14F-4D97-AF65-F5344CB8AC3E}">
+        <p14:creationId xmlns:p14="http://schemas.microsoft.com/office/powerpoint/2010/main" val="2797065715"/>
+      </p:ext>
+    </p:extLst>
   </p:cSld>
   <p:clrMapOvr>
     <a:masterClrMapping/>
@@ -2636,6 +2778,7 @@
           <a:p>
             <a:fld id="{D997B5FA-0921-464F-AAE1-844C04324D75}" type="datetimeFigureOut">
               <a:rPr lang="zh-CN" altLang="en-US" smtClean="0"/>
+              <a:t>2019/2/26</a:t>
             </a:fld>
             <a:endParaRPr lang="zh-CN" altLang="en-US"/>
           </a:p>
@@ -2677,6 +2820,7 @@
           <a:p>
             <a:fld id="{565CE74E-AB26-4998-AD42-012C4C1AD076}" type="slidenum">
               <a:rPr lang="zh-CN" altLang="en-US" smtClean="0"/>
+              <a:t>‹#›</a:t>
             </a:fld>
             <a:endParaRPr lang="zh-CN" altLang="en-US"/>
           </a:p>
@@ -2750,7 +2894,6 @@
               <a:rPr lang="zh-CN" altLang="en-US" smtClean="0"/>
               <a:t>单击此处编辑母版文本样式</a:t>
             </a:r>
-            <a:endParaRPr lang="zh-CN" altLang="en-US" smtClean="0"/>
           </a:p>
           <a:p>
             <a:pPr lvl="1"/>
@@ -2758,7 +2901,6 @@
               <a:rPr lang="zh-CN" altLang="en-US" smtClean="0"/>
               <a:t>第二级</a:t>
             </a:r>
-            <a:endParaRPr lang="zh-CN" altLang="en-US" smtClean="0"/>
           </a:p>
           <a:p>
             <a:pPr lvl="2"/>
@@ -2766,7 +2908,6 @@
               <a:rPr lang="zh-CN" altLang="en-US" smtClean="0"/>
               <a:t>第三级</a:t>
             </a:r>
-            <a:endParaRPr lang="zh-CN" altLang="en-US" smtClean="0"/>
           </a:p>
           <a:p>
             <a:pPr lvl="3"/>
@@ -2774,7 +2915,6 @@
               <a:rPr lang="zh-CN" altLang="en-US" smtClean="0"/>
               <a:t>第四级</a:t>
             </a:r>
-            <a:endParaRPr lang="zh-CN" altLang="en-US" smtClean="0"/>
           </a:p>
           <a:p>
             <a:pPr lvl="4"/>
@@ -2803,6 +2943,7 @@
           <a:p>
             <a:fld id="{D997B5FA-0921-464F-AAE1-844C04324D75}" type="datetimeFigureOut">
               <a:rPr lang="zh-CN" altLang="en-US" smtClean="0"/>
+              <a:t>2019/2/26</a:t>
             </a:fld>
             <a:endParaRPr lang="zh-CN" altLang="en-US"/>
           </a:p>
@@ -2844,6 +2985,7 @@
           <a:p>
             <a:fld id="{565CE74E-AB26-4998-AD42-012C4C1AD076}" type="slidenum">
               <a:rPr lang="zh-CN" altLang="en-US" smtClean="0"/>
+              <a:t>‹#›</a:t>
             </a:fld>
             <a:endParaRPr lang="zh-CN" altLang="en-US"/>
           </a:p>
@@ -2927,7 +3069,6 @@
               <a:rPr lang="zh-CN" altLang="en-US" smtClean="0"/>
               <a:t>单击此处编辑母版文本样式</a:t>
             </a:r>
-            <a:endParaRPr lang="zh-CN" altLang="en-US" smtClean="0"/>
           </a:p>
           <a:p>
             <a:pPr lvl="1"/>
@@ -2935,7 +3076,6 @@
               <a:rPr lang="zh-CN" altLang="en-US" smtClean="0"/>
               <a:t>第二级</a:t>
             </a:r>
-            <a:endParaRPr lang="zh-CN" altLang="en-US" smtClean="0"/>
           </a:p>
           <a:p>
             <a:pPr lvl="2"/>
@@ -2943,7 +3083,6 @@
               <a:rPr lang="zh-CN" altLang="en-US" smtClean="0"/>
               <a:t>第三级</a:t>
             </a:r>
-            <a:endParaRPr lang="zh-CN" altLang="en-US" smtClean="0"/>
           </a:p>
           <a:p>
             <a:pPr lvl="3"/>
@@ -2951,7 +3090,6 @@
               <a:rPr lang="zh-CN" altLang="en-US" smtClean="0"/>
               <a:t>第四级</a:t>
             </a:r>
-            <a:endParaRPr lang="zh-CN" altLang="en-US" smtClean="0"/>
           </a:p>
           <a:p>
             <a:pPr lvl="4"/>
@@ -2980,6 +3118,7 @@
           <a:p>
             <a:fld id="{D997B5FA-0921-464F-AAE1-844C04324D75}" type="datetimeFigureOut">
               <a:rPr lang="zh-CN" altLang="en-US" smtClean="0"/>
+              <a:t>2019/2/26</a:t>
             </a:fld>
             <a:endParaRPr lang="zh-CN" altLang="en-US"/>
           </a:p>
@@ -3021,6 +3160,7 @@
           <a:p>
             <a:fld id="{565CE74E-AB26-4998-AD42-012C4C1AD076}" type="slidenum">
               <a:rPr lang="zh-CN" altLang="en-US" smtClean="0"/>
+              <a:t>‹#›</a:t>
             </a:fld>
             <a:endParaRPr lang="zh-CN" altLang="en-US"/>
           </a:p>
@@ -3094,7 +3234,6 @@
               <a:rPr lang="zh-CN" altLang="en-US" smtClean="0"/>
               <a:t>单击此处编辑母版文本样式</a:t>
             </a:r>
-            <a:endParaRPr lang="zh-CN" altLang="en-US" smtClean="0"/>
           </a:p>
           <a:p>
             <a:pPr lvl="1"/>
@@ -3102,7 +3241,6 @@
               <a:rPr lang="zh-CN" altLang="en-US" smtClean="0"/>
               <a:t>第二级</a:t>
             </a:r>
-            <a:endParaRPr lang="zh-CN" altLang="en-US" smtClean="0"/>
           </a:p>
           <a:p>
             <a:pPr lvl="2"/>
@@ -3110,7 +3248,6 @@
               <a:rPr lang="zh-CN" altLang="en-US" smtClean="0"/>
               <a:t>第三级</a:t>
             </a:r>
-            <a:endParaRPr lang="zh-CN" altLang="en-US" smtClean="0"/>
           </a:p>
           <a:p>
             <a:pPr lvl="3"/>
@@ -3118,7 +3255,6 @@
               <a:rPr lang="zh-CN" altLang="en-US" smtClean="0"/>
               <a:t>第四级</a:t>
             </a:r>
-            <a:endParaRPr lang="zh-CN" altLang="en-US" smtClean="0"/>
           </a:p>
           <a:p>
             <a:pPr lvl="4"/>
@@ -3147,6 +3283,7 @@
           <a:p>
             <a:fld id="{D997B5FA-0921-464F-AAE1-844C04324D75}" type="datetimeFigureOut">
               <a:rPr lang="zh-CN" altLang="en-US" smtClean="0"/>
+              <a:t>2019/2/26</a:t>
             </a:fld>
             <a:endParaRPr lang="zh-CN" altLang="en-US"/>
           </a:p>
@@ -3188,6 +3325,7 @@
           <a:p>
             <a:fld id="{565CE74E-AB26-4998-AD42-012C4C1AD076}" type="slidenum">
               <a:rPr lang="zh-CN" altLang="en-US" smtClean="0"/>
+              <a:t>‹#›</a:t>
             </a:fld>
             <a:endParaRPr lang="zh-CN" altLang="en-US"/>
           </a:p>
@@ -3366,7 +3504,6 @@
               <a:rPr lang="zh-CN" altLang="en-US" smtClean="0"/>
               <a:t>单击此处编辑母版文本样式</a:t>
             </a:r>
-            <a:endParaRPr lang="zh-CN" altLang="en-US" smtClean="0"/>
           </a:p>
         </p:txBody>
       </p:sp>
@@ -3387,6 +3524,7 @@
           <a:p>
             <a:fld id="{D997B5FA-0921-464F-AAE1-844C04324D75}" type="datetimeFigureOut">
               <a:rPr lang="zh-CN" altLang="en-US" smtClean="0"/>
+              <a:t>2019/2/26</a:t>
             </a:fld>
             <a:endParaRPr lang="zh-CN" altLang="en-US"/>
           </a:p>
@@ -3428,6 +3566,7 @@
           <a:p>
             <a:fld id="{565CE74E-AB26-4998-AD42-012C4C1AD076}" type="slidenum">
               <a:rPr lang="zh-CN" altLang="en-US" smtClean="0"/>
+              <a:t>‹#›</a:t>
             </a:fld>
             <a:endParaRPr lang="zh-CN" altLang="en-US"/>
           </a:p>
@@ -3506,7 +3645,6 @@
               <a:rPr lang="zh-CN" altLang="en-US" smtClean="0"/>
               <a:t>单击此处编辑母版文本样式</a:t>
             </a:r>
-            <a:endParaRPr lang="zh-CN" altLang="en-US" smtClean="0"/>
           </a:p>
           <a:p>
             <a:pPr lvl="1"/>
@@ -3514,7 +3652,6 @@
               <a:rPr lang="zh-CN" altLang="en-US" smtClean="0"/>
               <a:t>第二级</a:t>
             </a:r>
-            <a:endParaRPr lang="zh-CN" altLang="en-US" smtClean="0"/>
           </a:p>
           <a:p>
             <a:pPr lvl="2"/>
@@ -3522,7 +3659,6 @@
               <a:rPr lang="zh-CN" altLang="en-US" smtClean="0"/>
               <a:t>第三级</a:t>
             </a:r>
-            <a:endParaRPr lang="zh-CN" altLang="en-US" smtClean="0"/>
           </a:p>
           <a:p>
             <a:pPr lvl="3"/>
@@ -3530,7 +3666,6 @@
               <a:rPr lang="zh-CN" altLang="en-US" smtClean="0"/>
               <a:t>第四级</a:t>
             </a:r>
-            <a:endParaRPr lang="zh-CN" altLang="en-US" smtClean="0"/>
           </a:p>
           <a:p>
             <a:pPr lvl="4"/>
@@ -3567,7 +3702,6 @@
               <a:rPr lang="zh-CN" altLang="en-US" smtClean="0"/>
               <a:t>单击此处编辑母版文本样式</a:t>
             </a:r>
-            <a:endParaRPr lang="zh-CN" altLang="en-US" smtClean="0"/>
           </a:p>
           <a:p>
             <a:pPr lvl="1"/>
@@ -3575,7 +3709,6 @@
               <a:rPr lang="zh-CN" altLang="en-US" smtClean="0"/>
               <a:t>第二级</a:t>
             </a:r>
-            <a:endParaRPr lang="zh-CN" altLang="en-US" smtClean="0"/>
           </a:p>
           <a:p>
             <a:pPr lvl="2"/>
@@ -3583,7 +3716,6 @@
               <a:rPr lang="zh-CN" altLang="en-US" smtClean="0"/>
               <a:t>第三级</a:t>
             </a:r>
-            <a:endParaRPr lang="zh-CN" altLang="en-US" smtClean="0"/>
           </a:p>
           <a:p>
             <a:pPr lvl="3"/>
@@ -3591,7 +3723,6 @@
               <a:rPr lang="zh-CN" altLang="en-US" smtClean="0"/>
               <a:t>第四级</a:t>
             </a:r>
-            <a:endParaRPr lang="zh-CN" altLang="en-US" smtClean="0"/>
           </a:p>
           <a:p>
             <a:pPr lvl="4"/>
@@ -3620,6 +3751,7 @@
           <a:p>
             <a:fld id="{D997B5FA-0921-464F-AAE1-844C04324D75}" type="datetimeFigureOut">
               <a:rPr lang="zh-CN" altLang="en-US" smtClean="0"/>
+              <a:t>2019/2/26</a:t>
             </a:fld>
             <a:endParaRPr lang="zh-CN" altLang="en-US"/>
           </a:p>
@@ -3661,6 +3793,7 @@
           <a:p>
             <a:fld id="{565CE74E-AB26-4998-AD42-012C4C1AD076}" type="slidenum">
               <a:rPr lang="zh-CN" altLang="en-US" smtClean="0"/>
+              <a:t>‹#›</a:t>
             </a:fld>
             <a:endParaRPr lang="zh-CN" altLang="en-US"/>
           </a:p>
@@ -3781,7 +3914,6 @@
               <a:rPr lang="zh-CN" altLang="en-US" smtClean="0"/>
               <a:t>单击此处编辑母版文本样式</a:t>
             </a:r>
-            <a:endParaRPr lang="zh-CN" altLang="en-US" smtClean="0"/>
           </a:p>
         </p:txBody>
       </p:sp>
@@ -3810,7 +3942,6 @@
               <a:rPr lang="zh-CN" altLang="en-US" smtClean="0"/>
               <a:t>单击此处编辑母版文本样式</a:t>
             </a:r>
-            <a:endParaRPr lang="zh-CN" altLang="en-US" smtClean="0"/>
           </a:p>
           <a:p>
             <a:pPr lvl="1"/>
@@ -3818,7 +3949,6 @@
               <a:rPr lang="zh-CN" altLang="en-US" smtClean="0"/>
               <a:t>第二级</a:t>
             </a:r>
-            <a:endParaRPr lang="zh-CN" altLang="en-US" smtClean="0"/>
           </a:p>
           <a:p>
             <a:pPr lvl="2"/>
@@ -3826,7 +3956,6 @@
               <a:rPr lang="zh-CN" altLang="en-US" smtClean="0"/>
               <a:t>第三级</a:t>
             </a:r>
-            <a:endParaRPr lang="zh-CN" altLang="en-US" smtClean="0"/>
           </a:p>
           <a:p>
             <a:pPr lvl="3"/>
@@ -3834,7 +3963,6 @@
               <a:rPr lang="zh-CN" altLang="en-US" smtClean="0"/>
               <a:t>第四级</a:t>
             </a:r>
-            <a:endParaRPr lang="zh-CN" altLang="en-US" smtClean="0"/>
           </a:p>
           <a:p>
             <a:pPr lvl="4"/>
@@ -3908,7 +4036,6 @@
               <a:rPr lang="zh-CN" altLang="en-US" smtClean="0"/>
               <a:t>单击此处编辑母版文本样式</a:t>
             </a:r>
-            <a:endParaRPr lang="zh-CN" altLang="en-US" smtClean="0"/>
           </a:p>
         </p:txBody>
       </p:sp>
@@ -3937,7 +4064,6 @@
               <a:rPr lang="zh-CN" altLang="en-US" smtClean="0"/>
               <a:t>单击此处编辑母版文本样式</a:t>
             </a:r>
-            <a:endParaRPr lang="zh-CN" altLang="en-US" smtClean="0"/>
           </a:p>
           <a:p>
             <a:pPr lvl="1"/>
@@ -3945,7 +4071,6 @@
               <a:rPr lang="zh-CN" altLang="en-US" smtClean="0"/>
               <a:t>第二级</a:t>
             </a:r>
-            <a:endParaRPr lang="zh-CN" altLang="en-US" smtClean="0"/>
           </a:p>
           <a:p>
             <a:pPr lvl="2"/>
@@ -3953,7 +4078,6 @@
               <a:rPr lang="zh-CN" altLang="en-US" smtClean="0"/>
               <a:t>第三级</a:t>
             </a:r>
-            <a:endParaRPr lang="zh-CN" altLang="en-US" smtClean="0"/>
           </a:p>
           <a:p>
             <a:pPr lvl="3"/>
@@ -3961,7 +4085,6 @@
               <a:rPr lang="zh-CN" altLang="en-US" smtClean="0"/>
               <a:t>第四级</a:t>
             </a:r>
-            <a:endParaRPr lang="zh-CN" altLang="en-US" smtClean="0"/>
           </a:p>
           <a:p>
             <a:pPr lvl="4"/>
@@ -3990,6 +4113,7 @@
           <a:p>
             <a:fld id="{D997B5FA-0921-464F-AAE1-844C04324D75}" type="datetimeFigureOut">
               <a:rPr lang="zh-CN" altLang="en-US" smtClean="0"/>
+              <a:t>2019/2/26</a:t>
             </a:fld>
             <a:endParaRPr lang="zh-CN" altLang="en-US"/>
           </a:p>
@@ -4031,6 +4155,7 @@
           <a:p>
             <a:fld id="{565CE74E-AB26-4998-AD42-012C4C1AD076}" type="slidenum">
               <a:rPr lang="zh-CN" altLang="en-US" smtClean="0"/>
+              <a:t>‹#›</a:t>
             </a:fld>
             <a:endParaRPr lang="zh-CN" altLang="en-US"/>
           </a:p>
@@ -4101,6 +4226,7 @@
           <a:p>
             <a:fld id="{D997B5FA-0921-464F-AAE1-844C04324D75}" type="datetimeFigureOut">
               <a:rPr lang="zh-CN" altLang="en-US" smtClean="0"/>
+              <a:t>2019/2/26</a:t>
             </a:fld>
             <a:endParaRPr lang="zh-CN" altLang="en-US"/>
           </a:p>
@@ -4142,6 +4268,7 @@
           <a:p>
             <a:fld id="{565CE74E-AB26-4998-AD42-012C4C1AD076}" type="slidenum">
               <a:rPr lang="zh-CN" altLang="en-US" smtClean="0"/>
+              <a:t>‹#›</a:t>
             </a:fld>
             <a:endParaRPr lang="zh-CN" altLang="en-US"/>
           </a:p>
@@ -4189,6 +4316,7 @@
           <a:p>
             <a:fld id="{D997B5FA-0921-464F-AAE1-844C04324D75}" type="datetimeFigureOut">
               <a:rPr lang="zh-CN" altLang="en-US" smtClean="0"/>
+              <a:t>2019/2/26</a:t>
             </a:fld>
             <a:endParaRPr lang="zh-CN" altLang="en-US"/>
           </a:p>
@@ -4230,6 +4358,7 @@
           <a:p>
             <a:fld id="{565CE74E-AB26-4998-AD42-012C4C1AD076}" type="slidenum">
               <a:rPr lang="zh-CN" altLang="en-US" smtClean="0"/>
+              <a:t>‹#›</a:t>
             </a:fld>
             <a:endParaRPr lang="zh-CN" altLang="en-US"/>
           </a:p>
@@ -4345,7 +4474,6 @@
               <a:rPr lang="zh-CN" altLang="en-US" smtClean="0"/>
               <a:t>单击此处编辑母版文本样式</a:t>
             </a:r>
-            <a:endParaRPr lang="zh-CN" altLang="en-US" smtClean="0"/>
           </a:p>
           <a:p>
             <a:pPr lvl="1"/>
@@ -4353,7 +4481,6 @@
               <a:rPr lang="zh-CN" altLang="en-US" smtClean="0"/>
               <a:t>第二级</a:t>
             </a:r>
-            <a:endParaRPr lang="zh-CN" altLang="en-US" smtClean="0"/>
           </a:p>
           <a:p>
             <a:pPr lvl="2"/>
@@ -4361,7 +4488,6 @@
               <a:rPr lang="zh-CN" altLang="en-US" smtClean="0"/>
               <a:t>第三级</a:t>
             </a:r>
-            <a:endParaRPr lang="zh-CN" altLang="en-US" smtClean="0"/>
           </a:p>
           <a:p>
             <a:pPr lvl="3"/>
@@ -4369,7 +4495,6 @@
               <a:rPr lang="zh-CN" altLang="en-US" smtClean="0"/>
               <a:t>第四级</a:t>
             </a:r>
-            <a:endParaRPr lang="zh-CN" altLang="en-US" smtClean="0"/>
           </a:p>
           <a:p>
             <a:pPr lvl="4"/>
@@ -4443,7 +4568,6 @@
               <a:rPr lang="zh-CN" altLang="en-US" smtClean="0"/>
               <a:t>单击此处编辑母版文本样式</a:t>
             </a:r>
-            <a:endParaRPr lang="zh-CN" altLang="en-US" smtClean="0"/>
           </a:p>
         </p:txBody>
       </p:sp>
@@ -4464,6 +4588,7 @@
           <a:p>
             <a:fld id="{D997B5FA-0921-464F-AAE1-844C04324D75}" type="datetimeFigureOut">
               <a:rPr lang="zh-CN" altLang="en-US" smtClean="0"/>
+              <a:t>2019/2/26</a:t>
             </a:fld>
             <a:endParaRPr lang="zh-CN" altLang="en-US"/>
           </a:p>
@@ -4505,6 +4630,7 @@
           <a:p>
             <a:fld id="{565CE74E-AB26-4998-AD42-012C4C1AD076}" type="slidenum">
               <a:rPr lang="zh-CN" altLang="en-US" smtClean="0"/>
+              <a:t>‹#›</a:t>
             </a:fld>
             <a:endParaRPr lang="zh-CN" altLang="en-US"/>
           </a:p>
@@ -4690,7 +4816,6 @@
               <a:rPr lang="zh-CN" altLang="en-US" smtClean="0"/>
               <a:t>单击此处编辑母版文本样式</a:t>
             </a:r>
-            <a:endParaRPr lang="zh-CN" altLang="en-US" smtClean="0"/>
           </a:p>
         </p:txBody>
       </p:sp>
@@ -4711,6 +4836,7 @@
           <a:p>
             <a:fld id="{D997B5FA-0921-464F-AAE1-844C04324D75}" type="datetimeFigureOut">
               <a:rPr lang="zh-CN" altLang="en-US" smtClean="0"/>
+              <a:t>2019/2/26</a:t>
             </a:fld>
             <a:endParaRPr lang="zh-CN" altLang="en-US"/>
           </a:p>
@@ -4752,6 +4878,7 @@
           <a:p>
             <a:fld id="{565CE74E-AB26-4998-AD42-012C4C1AD076}" type="slidenum">
               <a:rPr lang="zh-CN" altLang="en-US" smtClean="0"/>
+              <a:t>‹#›</a:t>
             </a:fld>
             <a:endParaRPr lang="zh-CN" altLang="en-US"/>
           </a:p>
@@ -4850,7 +4977,6 @@
               <a:rPr lang="zh-CN" altLang="en-US" smtClean="0"/>
               <a:t>单击此处编辑母版文本样式</a:t>
             </a:r>
-            <a:endParaRPr lang="zh-CN" altLang="en-US" smtClean="0"/>
           </a:p>
           <a:p>
             <a:pPr lvl="1"/>
@@ -4858,7 +4984,6 @@
               <a:rPr lang="zh-CN" altLang="en-US" smtClean="0"/>
               <a:t>第二级</a:t>
             </a:r>
-            <a:endParaRPr lang="zh-CN" altLang="en-US" smtClean="0"/>
           </a:p>
           <a:p>
             <a:pPr lvl="2"/>
@@ -4866,7 +4991,6 @@
               <a:rPr lang="zh-CN" altLang="en-US" smtClean="0"/>
               <a:t>第三级</a:t>
             </a:r>
-            <a:endParaRPr lang="zh-CN" altLang="en-US" smtClean="0"/>
           </a:p>
           <a:p>
             <a:pPr lvl="3"/>
@@ -4874,7 +4998,6 @@
               <a:rPr lang="zh-CN" altLang="en-US" smtClean="0"/>
               <a:t>第四级</a:t>
             </a:r>
-            <a:endParaRPr lang="zh-CN" altLang="en-US" smtClean="0"/>
           </a:p>
           <a:p>
             <a:pPr lvl="4"/>
@@ -4921,6 +5044,7 @@
           <a:p>
             <a:fld id="{D997B5FA-0921-464F-AAE1-844C04324D75}" type="datetimeFigureOut">
               <a:rPr lang="zh-CN" altLang="en-US" smtClean="0"/>
+              <a:t>2019/2/26</a:t>
             </a:fld>
             <a:endParaRPr lang="zh-CN" altLang="en-US"/>
           </a:p>
@@ -4998,6 +5122,7 @@
           <a:p>
             <a:fld id="{565CE74E-AB26-4998-AD42-012C4C1AD076}" type="slidenum">
               <a:rPr lang="zh-CN" altLang="en-US" smtClean="0"/>
+              <a:t>‹#›</a:t>
             </a:fld>
             <a:endParaRPr lang="zh-CN" altLang="en-US"/>
           </a:p>
@@ -5414,7 +5539,7 @@
           <a:p>
             <a:r>
               <a:rPr lang="en-US" altLang="zh-CN" dirty="0" smtClean="0"/>
-              <a:t>Less code</a:t>
+              <a:t>Immutable Pattern</a:t>
             </a:r>
             <a:endParaRPr lang="zh-CN" altLang="en-US" dirty="0"/>
           </a:p>
@@ -5430,19 +5555,48 @@
             <p:ph idx="1"/>
           </p:nvPr>
         </p:nvSpPr>
-        <p:spPr/>
+        <p:spPr>
+          <a:xfrm>
+            <a:off x="838200" y="4293982"/>
+            <a:ext cx="10515600" cy="1959334"/>
+          </a:xfrm>
+        </p:spPr>
         <p:txBody>
           <a:bodyPr/>
           <a:lstStyle/>
           <a:p>
             <a:r>
               <a:rPr lang="en-US" altLang="zh-CN" dirty="0" smtClean="0"/>
-              <a:t>Less code, easy for maintain</a:t>
+              <a:t>For it is immutable, then it’s easy to run parallel</a:t>
             </a:r>
             <a:endParaRPr lang="zh-CN" altLang="en-US" dirty="0"/>
           </a:p>
         </p:txBody>
       </p:sp>
+      <p:pic>
+        <p:nvPicPr>
+          <p:cNvPr id="4" name="图片 3"/>
+          <p:cNvPicPr>
+            <a:picLocks noChangeAspect="1"/>
+          </p:cNvPicPr>
+          <p:nvPr/>
+        </p:nvPicPr>
+        <p:blipFill>
+          <a:blip r:embed="rId3"/>
+          <a:stretch>
+            <a:fillRect/>
+          </a:stretch>
+        </p:blipFill>
+        <p:spPr>
+          <a:xfrm>
+            <a:off x="838200" y="1825625"/>
+            <a:ext cx="10139706" cy="2333420"/>
+          </a:xfrm>
+          <a:prstGeom prst="rect">
+            <a:avLst/>
+          </a:prstGeom>
+        </p:spPr>
+      </p:pic>
     </p:spTree>
   </p:cSld>
   <p:clrMapOvr>
@@ -5492,11 +5646,7 @@
           <a:p>
             <a:r>
               <a:rPr lang="en-US" altLang="zh-CN" dirty="0" smtClean="0"/>
-              <a:t>@</a:t>
-            </a:r>
-            <a:r>
-              <a:rPr lang="en-US" altLang="zh-CN" dirty="0" err="1" smtClean="0"/>
-              <a:t>FuncationalInterface</a:t>
+              <a:t>Less code</a:t>
             </a:r>
             <a:endParaRPr lang="zh-CN" altLang="en-US" dirty="0"/>
           </a:p>
@@ -5518,99 +5668,9 @@
           <a:lstStyle/>
           <a:p>
             <a:r>
-              <a:rPr lang="en-US" altLang="zh-CN" i="1" dirty="0"/>
-              <a:t>Conceptually, a functional interface has exactly one abstract method</a:t>
-            </a:r>
-            <a:r>
-              <a:rPr lang="en-US" altLang="zh-CN" i="1" dirty="0" smtClean="0"/>
-              <a:t>.</a:t>
-            </a:r>
-            <a:endParaRPr lang="en-US" altLang="zh-CN" i="1" dirty="0" smtClean="0"/>
-          </a:p>
-          <a:p>
-            <a:endParaRPr lang="en-US" altLang="zh-CN" i="1" dirty="0"/>
-          </a:p>
-          <a:p>
-            <a:pPr lvl="1"/>
-            <a:r>
-              <a:rPr lang="en-US" altLang="zh-CN" i="1" dirty="0" smtClean="0"/>
-              <a:t>If one interface follows definition of @</a:t>
-            </a:r>
-            <a:r>
-              <a:rPr lang="en-US" altLang="zh-CN" i="1" dirty="0" err="1" smtClean="0"/>
-              <a:t>FuncationalInterface</a:t>
-            </a:r>
-            <a:r>
-              <a:rPr lang="en-US" altLang="zh-CN" i="1" dirty="0" smtClean="0"/>
-              <a:t> without @</a:t>
-            </a:r>
-            <a:r>
-              <a:rPr lang="en-US" altLang="zh-CN" i="1" dirty="0" err="1" smtClean="0"/>
-              <a:t>FuncationalInterface</a:t>
-            </a:r>
-            <a:r>
-              <a:rPr lang="en-US" altLang="zh-CN" i="1" dirty="0" smtClean="0"/>
-              <a:t> annotation, compiler will consider it as a </a:t>
-            </a:r>
-            <a:r>
-              <a:rPr lang="en-US" altLang="zh-CN" i="1" dirty="0" err="1" smtClean="0"/>
-              <a:t>funcational</a:t>
-            </a:r>
-            <a:r>
-              <a:rPr lang="en-US" altLang="zh-CN" i="1" dirty="0" smtClean="0"/>
-              <a:t> interface, just like @Override.</a:t>
-            </a:r>
-            <a:endParaRPr lang="en-US" altLang="zh-CN" i="1" dirty="0" smtClean="0"/>
-          </a:p>
-          <a:p>
-            <a:pPr lvl="1"/>
-            <a:endParaRPr lang="en-US" altLang="zh-CN" i="1" dirty="0"/>
-          </a:p>
-          <a:p>
-            <a:pPr lvl="1"/>
-            <a:r>
-              <a:rPr lang="en-US" altLang="zh-CN" i="1" dirty="0" smtClean="0"/>
-              <a:t>If one interface doesn’t follow definition of @</a:t>
-            </a:r>
-            <a:r>
-              <a:rPr lang="en-US" altLang="zh-CN" i="1" dirty="0" err="1" smtClean="0"/>
-              <a:t>FuncationalInterface</a:t>
-            </a:r>
-            <a:r>
-              <a:rPr lang="en-US" altLang="zh-CN" i="1" dirty="0" smtClean="0"/>
-              <a:t> with @</a:t>
-            </a:r>
-            <a:r>
-              <a:rPr lang="en-US" altLang="zh-CN" i="1" dirty="0" err="1" smtClean="0"/>
-              <a:t>FuncationalInterface</a:t>
-            </a:r>
-            <a:r>
-              <a:rPr lang="en-US" altLang="zh-CN" i="1" dirty="0" smtClean="0"/>
-              <a:t> annotation, compile will raise an exception.</a:t>
-            </a:r>
-            <a:endParaRPr lang="en-US" altLang="zh-CN" i="1" dirty="0" smtClean="0"/>
-          </a:p>
-          <a:p>
-            <a:pPr lvl="1"/>
-            <a:endParaRPr lang="en-US" altLang="zh-CN" i="1" dirty="0" smtClean="0"/>
-          </a:p>
-          <a:p>
-            <a:pPr lvl="1"/>
-            <a:r>
-              <a:rPr lang="en-US" altLang="zh-CN" i="1" dirty="0" smtClean="0"/>
-              <a:t>It could have default method, and methods implemented by </a:t>
-            </a:r>
-            <a:r>
-              <a:rPr lang="en-US" altLang="zh-CN" i="1" dirty="0" err="1" smtClean="0"/>
-              <a:t>java.lang.Object</a:t>
-            </a:r>
-            <a:endParaRPr lang="en-US" altLang="zh-CN" i="1" dirty="0"/>
-          </a:p>
-          <a:p>
-            <a:pPr lvl="1"/>
-            <a:endParaRPr lang="zh-CN" altLang="en-US" dirty="0"/>
-          </a:p>
-          <a:p>
+              <a:rPr lang="en-US" altLang="zh-CN" dirty="0" smtClean="0"/>
+              <a:t>Less code, easy for maintain</a:t>
+            </a:r>
             <a:endParaRPr lang="zh-CN" altLang="en-US" dirty="0"/>
           </a:p>
         </p:txBody>
@@ -5674,56 +5734,118 @@
           </a:p>
         </p:txBody>
       </p:sp>
-      <p:pic>
-        <p:nvPicPr>
-          <p:cNvPr id="5" name="内容占位符 4"/>
-          <p:cNvPicPr>
-            <a:picLocks noGrp="1" noChangeAspect="1"/>
-          </p:cNvPicPr>
+      <p:sp>
+        <p:nvSpPr>
+          <p:cNvPr id="3" name="内容占位符 2"/>
+          <p:cNvSpPr>
+            <a:spLocks noGrp="1"/>
+          </p:cNvSpPr>
           <p:nvPr>
             <p:ph idx="1"/>
           </p:nvPr>
-        </p:nvPicPr>
-        <p:blipFill>
-          <a:blip r:embed="rId1"/>
-          <a:stretch>
-            <a:fillRect/>
-          </a:stretch>
-        </p:blipFill>
-        <p:spPr>
-          <a:xfrm>
-            <a:off x="838198" y="4197016"/>
-            <a:ext cx="6657193" cy="2190615"/>
-          </a:xfrm>
-          <a:prstGeom prst="rect">
-            <a:avLst/>
-          </a:prstGeom>
-        </p:spPr>
-      </p:pic>
-      <p:pic>
-        <p:nvPicPr>
-          <p:cNvPr id="4" name="图片 3"/>
-          <p:cNvPicPr>
-            <a:picLocks noChangeAspect="1"/>
-          </p:cNvPicPr>
-          <p:nvPr/>
-        </p:nvPicPr>
-        <p:blipFill>
-          <a:blip r:embed="rId2"/>
-          <a:stretch>
-            <a:fillRect/>
-          </a:stretch>
-        </p:blipFill>
-        <p:spPr>
-          <a:xfrm>
-            <a:off x="838199" y="1825625"/>
-            <a:ext cx="6657193" cy="1596001"/>
-          </a:xfrm>
-          <a:prstGeom prst="rect">
-            <a:avLst/>
-          </a:prstGeom>
-        </p:spPr>
-      </p:pic>
+        </p:nvSpPr>
+        <p:spPr/>
+        <p:txBody>
+          <a:bodyPr>
+            <a:normAutofit fontScale="92500" lnSpcReduction="10000"/>
+          </a:bodyPr>
+          <a:lstStyle/>
+          <a:p>
+            <a:r>
+              <a:rPr lang="en-US" altLang="zh-CN" i="1" dirty="0"/>
+              <a:t>Conceptually, a functional interface has exactly one abstract method</a:t>
+            </a:r>
+            <a:r>
+              <a:rPr lang="en-US" altLang="zh-CN" i="1" dirty="0" smtClean="0"/>
+              <a:t>.</a:t>
+            </a:r>
+          </a:p>
+          <a:p>
+            <a:endParaRPr lang="en-US" altLang="zh-CN" i="1" dirty="0"/>
+          </a:p>
+          <a:p>
+            <a:pPr lvl="1"/>
+            <a:r>
+              <a:rPr lang="en-US" altLang="zh-CN" i="1" dirty="0" smtClean="0"/>
+              <a:t>If one interface follows definition of @</a:t>
+            </a:r>
+            <a:r>
+              <a:rPr lang="en-US" altLang="zh-CN" i="1" dirty="0" err="1" smtClean="0"/>
+              <a:t>FuncationalInterface</a:t>
+            </a:r>
+            <a:r>
+              <a:rPr lang="en-US" altLang="zh-CN" i="1" dirty="0" smtClean="0"/>
+              <a:t> without @</a:t>
+            </a:r>
+            <a:r>
+              <a:rPr lang="en-US" altLang="zh-CN" i="1" dirty="0" err="1" smtClean="0"/>
+              <a:t>FuncationalInterface</a:t>
+            </a:r>
+            <a:r>
+              <a:rPr lang="en-US" altLang="zh-CN" i="1" dirty="0" smtClean="0"/>
+              <a:t> annotation, compiler will consider it as a </a:t>
+            </a:r>
+            <a:r>
+              <a:rPr lang="en-US" altLang="zh-CN" i="1" dirty="0" err="1" smtClean="0"/>
+              <a:t>funcational</a:t>
+            </a:r>
+            <a:r>
+              <a:rPr lang="en-US" altLang="zh-CN" i="1" dirty="0" smtClean="0"/>
+              <a:t> interface, just like @Override.</a:t>
+            </a:r>
+          </a:p>
+          <a:p>
+            <a:pPr lvl="1"/>
+            <a:endParaRPr lang="en-US" altLang="zh-CN" i="1" dirty="0"/>
+          </a:p>
+          <a:p>
+            <a:pPr lvl="1"/>
+            <a:r>
+              <a:rPr lang="en-US" altLang="zh-CN" i="1" dirty="0" smtClean="0"/>
+              <a:t>If one interface doesn’t follow definition of @</a:t>
+            </a:r>
+            <a:r>
+              <a:rPr lang="en-US" altLang="zh-CN" i="1" dirty="0" err="1" smtClean="0"/>
+              <a:t>FuncationalInterface</a:t>
+            </a:r>
+            <a:r>
+              <a:rPr lang="en-US" altLang="zh-CN" i="1" dirty="0" smtClean="0"/>
+              <a:t> with @</a:t>
+            </a:r>
+            <a:r>
+              <a:rPr lang="en-US" altLang="zh-CN" i="1" dirty="0" err="1" smtClean="0"/>
+              <a:t>FuncationalInterface</a:t>
+            </a:r>
+            <a:r>
+              <a:rPr lang="en-US" altLang="zh-CN" i="1" dirty="0" smtClean="0"/>
+              <a:t> annotation, compile will raise an exception.</a:t>
+            </a:r>
+          </a:p>
+          <a:p>
+            <a:pPr lvl="1"/>
+            <a:endParaRPr lang="en-US" altLang="zh-CN" i="1" dirty="0" smtClean="0"/>
+          </a:p>
+          <a:p>
+            <a:pPr lvl="1"/>
+            <a:r>
+              <a:rPr lang="en-US" altLang="zh-CN" i="1" dirty="0" smtClean="0"/>
+              <a:t>It could have default method, and methods implemented by </a:t>
+            </a:r>
+            <a:r>
+              <a:rPr lang="en-US" altLang="zh-CN" i="1" dirty="0" err="1" smtClean="0"/>
+              <a:t>java.lang.Object</a:t>
+            </a:r>
+            <a:endParaRPr lang="en-US" altLang="zh-CN" i="1" dirty="0"/>
+          </a:p>
+          <a:p>
+            <a:pPr lvl="1"/>
+            <a:endParaRPr lang="zh-CN" altLang="en-US" dirty="0"/>
+          </a:p>
+          <a:p>
+            <a:endParaRPr lang="zh-CN" altLang="en-US" dirty="0"/>
+          </a:p>
+        </p:txBody>
+      </p:sp>
     </p:spTree>
   </p:cSld>
   <p:clrMapOvr>
@@ -5773,93 +5895,66 @@
           <a:p>
             <a:r>
               <a:rPr lang="en-US" altLang="zh-CN" dirty="0" smtClean="0"/>
-              <a:t>Lambda expression</a:t>
+              <a:t>@</a:t>
+            </a:r>
+            <a:r>
+              <a:rPr lang="en-US" altLang="zh-CN" dirty="0" err="1" smtClean="0"/>
+              <a:t>FuncationalInterface</a:t>
             </a:r>
             <a:endParaRPr lang="zh-CN" altLang="en-US" dirty="0"/>
           </a:p>
         </p:txBody>
       </p:sp>
-      <p:sp>
-        <p:nvSpPr>
-          <p:cNvPr id="3" name="内容占位符 2"/>
-          <p:cNvSpPr>
-            <a:spLocks noGrp="1"/>
-          </p:cNvSpPr>
+      <p:pic>
+        <p:nvPicPr>
+          <p:cNvPr id="5" name="内容占位符 4"/>
+          <p:cNvPicPr>
+            <a:picLocks noGrp="1" noChangeAspect="1"/>
+          </p:cNvPicPr>
           <p:nvPr>
             <p:ph idx="1"/>
           </p:nvPr>
-        </p:nvSpPr>
-        <p:spPr/>
-        <p:txBody>
-          <a:bodyPr/>
-          <a:lstStyle/>
-          <a:p>
-            <a:r>
-              <a:rPr lang="en-US" altLang="zh-CN" dirty="0" smtClean="0"/>
-              <a:t>Lambda expression is anonymous method.</a:t>
-            </a:r>
-            <a:endParaRPr lang="en-US" altLang="zh-CN" dirty="0" smtClean="0"/>
-          </a:p>
-          <a:p>
-            <a:endParaRPr lang="en-US" altLang="zh-CN" dirty="0"/>
-          </a:p>
-          <a:p>
-            <a:r>
-              <a:rPr lang="zh-CN" altLang="en-US" dirty="0" smtClean="0"/>
-              <a:t>和匿名对象一样</a:t>
-            </a:r>
-            <a:r>
-              <a:rPr lang="en-US" altLang="zh-CN" dirty="0" smtClean="0"/>
-              <a:t>Lambda</a:t>
-            </a:r>
-            <a:r>
-              <a:rPr lang="zh-CN" altLang="en-US" dirty="0" smtClean="0"/>
-              <a:t>表达式也可以访问外部的局部变量，外部的局部变量必须申明为</a:t>
-            </a:r>
-            <a:r>
-              <a:rPr lang="en-US" altLang="zh-CN" dirty="0" smtClean="0"/>
-              <a:t>final.</a:t>
-            </a:r>
-            <a:endParaRPr lang="en-US" altLang="zh-CN" dirty="0" smtClean="0"/>
-          </a:p>
-          <a:p>
-            <a:endParaRPr lang="en-US" altLang="zh-CN" dirty="0"/>
-          </a:p>
-          <a:p>
-            <a:r>
-              <a:rPr lang="en-US" altLang="zh-CN" dirty="0" smtClean="0"/>
-              <a:t>Java 8</a:t>
-            </a:r>
-            <a:r>
-              <a:rPr lang="zh-CN" altLang="en-US" dirty="0" smtClean="0"/>
-              <a:t>自动将外部的局部变量视为</a:t>
-            </a:r>
-            <a:r>
-              <a:rPr lang="en-US" altLang="zh-CN" dirty="0" smtClean="0"/>
-              <a:t>final, </a:t>
-            </a:r>
-            <a:r>
-              <a:rPr lang="zh-CN" altLang="en-US" dirty="0" smtClean="0"/>
-              <a:t>若在</a:t>
-            </a:r>
-            <a:r>
-              <a:rPr lang="en-US" altLang="zh-CN" dirty="0" smtClean="0"/>
-              <a:t>Lambda</a:t>
-            </a:r>
-            <a:r>
-              <a:rPr lang="zh-CN" altLang="en-US" dirty="0" smtClean="0"/>
-              <a:t>表达式中对其做更改将会报错。</a:t>
-            </a:r>
-            <a:endParaRPr lang="en-US" altLang="zh-CN" dirty="0" smtClean="0"/>
-          </a:p>
-          <a:p>
-            <a:endParaRPr lang="en-US" altLang="zh-CN" dirty="0"/>
-          </a:p>
-          <a:p>
-            <a:endParaRPr lang="zh-CN" altLang="en-US" dirty="0"/>
-          </a:p>
-        </p:txBody>
-      </p:sp>
+        </p:nvPicPr>
+        <p:blipFill>
+          <a:blip r:embed="rId3"/>
+          <a:stretch>
+            <a:fillRect/>
+          </a:stretch>
+        </p:blipFill>
+        <p:spPr>
+          <a:xfrm>
+            <a:off x="838198" y="4197016"/>
+            <a:ext cx="6657193" cy="2190615"/>
+          </a:xfrm>
+          <a:prstGeom prst="rect">
+            <a:avLst/>
+          </a:prstGeom>
+        </p:spPr>
+      </p:pic>
+      <p:pic>
+        <p:nvPicPr>
+          <p:cNvPr id="4" name="图片 3"/>
+          <p:cNvPicPr>
+            <a:picLocks noChangeAspect="1"/>
+          </p:cNvPicPr>
+          <p:nvPr/>
+        </p:nvPicPr>
+        <p:blipFill>
+          <a:blip r:embed="rId4"/>
+          <a:stretch>
+            <a:fillRect/>
+          </a:stretch>
+        </p:blipFill>
+        <p:spPr>
+          <a:xfrm>
+            <a:off x="838199" y="1825625"/>
+            <a:ext cx="6657193" cy="1596001"/>
+          </a:xfrm>
+          <a:prstGeom prst="rect">
+            <a:avLst/>
+          </a:prstGeom>
+        </p:spPr>
+      </p:pic>
     </p:spTree>
   </p:cSld>
   <p:clrMapOvr>
@@ -5909,7 +6004,7 @@
           <a:p>
             <a:r>
               <a:rPr lang="en-US" altLang="zh-CN" dirty="0" smtClean="0"/>
-              <a:t>Method reference</a:t>
+              <a:t>Lambda expression</a:t>
             </a:r>
             <a:endParaRPr lang="zh-CN" altLang="en-US" dirty="0"/>
           </a:p>
@@ -5931,100 +6026,65 @@
           <a:lstStyle/>
           <a:p>
             <a:r>
+              <a:rPr lang="en-US" altLang="zh-CN" dirty="0" smtClean="0"/>
+              <a:t>Lambda expression is anonymous method.</a:t>
+            </a:r>
+          </a:p>
+          <a:p>
+            <a:endParaRPr lang="en-US" altLang="zh-CN" dirty="0"/>
+          </a:p>
+          <a:p>
+            <a:r>
               <a:rPr lang="zh-CN" altLang="en-US" dirty="0" smtClean="0"/>
-              <a:t>静态方法引用： </a:t>
-            </a:r>
-            <a:r>
-              <a:rPr lang="en-US" altLang="zh-CN" dirty="0" err="1" smtClean="0"/>
-              <a:t>ClassName</a:t>
+              <a:t>和匿名对象一样</a:t>
             </a:r>
             <a:r>
               <a:rPr lang="en-US" altLang="zh-CN" dirty="0" smtClean="0"/>
-              <a:t>::</a:t>
-            </a:r>
-            <a:r>
-              <a:rPr lang="en-US" altLang="zh-CN" dirty="0" err="1" smtClean="0"/>
-              <a:t>methodName</a:t>
+              <a:t>Lambda</a:t>
+            </a:r>
+            <a:r>
+              <a:rPr lang="zh-CN" altLang="en-US" dirty="0" smtClean="0"/>
+              <a:t>表达式也可以访问外部的局部变量，外部的局部变量必须申明为</a:t>
+            </a:r>
+            <a:r>
+              <a:rPr lang="en-US" altLang="zh-CN" dirty="0" smtClean="0"/>
+              <a:t>final.</a:t>
+            </a:r>
+          </a:p>
+          <a:p>
+            <a:endParaRPr lang="en-US" altLang="zh-CN" dirty="0"/>
+          </a:p>
+          <a:p>
+            <a:r>
+              <a:rPr lang="en-US" altLang="zh-CN" dirty="0" smtClean="0"/>
+              <a:t>Java 8</a:t>
+            </a:r>
+            <a:r>
+              <a:rPr lang="zh-CN" altLang="en-US" dirty="0" smtClean="0"/>
+              <a:t>自动将外部的局部变量视为</a:t>
+            </a:r>
+            <a:r>
+              <a:rPr lang="en-US" altLang="zh-CN" dirty="0" smtClean="0"/>
+              <a:t>final, </a:t>
+            </a:r>
+            <a:r>
+              <a:rPr lang="zh-CN" altLang="en-US" dirty="0" smtClean="0"/>
+              <a:t>若在</a:t>
+            </a:r>
+            <a:r>
+              <a:rPr lang="en-US" altLang="zh-CN" dirty="0" smtClean="0"/>
+              <a:t>Lambda</a:t>
+            </a:r>
+            <a:r>
+              <a:rPr lang="zh-CN" altLang="en-US" dirty="0" smtClean="0"/>
+              <a:t>表达式中对其做更改将会报错。</a:t>
             </a:r>
             <a:endParaRPr lang="en-US" altLang="zh-CN" dirty="0" smtClean="0"/>
           </a:p>
           <a:p>
-            <a:r>
-              <a:rPr lang="zh-CN" altLang="en-US" dirty="0" smtClean="0"/>
-              <a:t>实例上的实例方法引用： </a:t>
-            </a:r>
-            <a:r>
-              <a:rPr lang="en-US" altLang="zh-CN" dirty="0" err="1" smtClean="0"/>
-              <a:t>instanceReference</a:t>
-            </a:r>
-            <a:r>
-              <a:rPr lang="en-US" altLang="zh-CN" dirty="0" smtClean="0"/>
-              <a:t>::</a:t>
-            </a:r>
-            <a:r>
-              <a:rPr lang="en-US" altLang="zh-CN" dirty="0" err="1" smtClean="0"/>
-              <a:t>methodName</a:t>
-            </a:r>
-            <a:endParaRPr lang="en-US" altLang="zh-CN" dirty="0" smtClean="0"/>
-          </a:p>
-          <a:p>
-            <a:r>
-              <a:rPr lang="zh-CN" altLang="en-US" dirty="0" smtClean="0"/>
-              <a:t>超类上的实例方法引用： </a:t>
-            </a:r>
-            <a:r>
-              <a:rPr lang="en-US" altLang="zh-CN" dirty="0" smtClean="0"/>
-              <a:t>super::</a:t>
-            </a:r>
-            <a:r>
-              <a:rPr lang="en-US" altLang="zh-CN" dirty="0" err="1" smtClean="0"/>
-              <a:t>methodName</a:t>
-            </a:r>
-            <a:endParaRPr lang="en-US" altLang="zh-CN" dirty="0" smtClean="0"/>
-          </a:p>
-          <a:p>
-            <a:r>
-              <a:rPr lang="zh-CN" altLang="en-US" dirty="0" smtClean="0"/>
-              <a:t>类型上的实例方法引用： </a:t>
-            </a:r>
-            <a:r>
-              <a:rPr lang="en-US" altLang="zh-CN" dirty="0" err="1" smtClean="0"/>
-              <a:t>ClassName</a:t>
-            </a:r>
-            <a:r>
-              <a:rPr lang="en-US" altLang="zh-CN" dirty="0" smtClean="0"/>
-              <a:t>::</a:t>
-            </a:r>
-            <a:r>
-              <a:rPr lang="en-US" altLang="zh-CN" dirty="0" err="1" smtClean="0"/>
-              <a:t>methodName</a:t>
-            </a:r>
-            <a:endParaRPr lang="en-US" altLang="zh-CN" dirty="0" smtClean="0"/>
-          </a:p>
-          <a:p>
-            <a:r>
-              <a:rPr lang="zh-CN" altLang="en-US" dirty="0" smtClean="0"/>
-              <a:t>构造方法引用： </a:t>
-            </a:r>
-            <a:r>
-              <a:rPr lang="en-US" altLang="zh-CN" dirty="0" smtClean="0"/>
-              <a:t>Class::new</a:t>
-            </a:r>
-            <a:endParaRPr lang="en-US" altLang="zh-CN" dirty="0" smtClean="0"/>
-          </a:p>
-          <a:p>
-            <a:r>
-              <a:rPr lang="zh-CN" altLang="en-US" dirty="0" smtClean="0"/>
-              <a:t>数组构造方法引用：</a:t>
-            </a:r>
-            <a:r>
-              <a:rPr lang="en-US" altLang="zh-CN" dirty="0" err="1" smtClean="0"/>
-              <a:t>TypeName</a:t>
-            </a:r>
-            <a:r>
-              <a:rPr lang="en-US" altLang="zh-CN" dirty="0" smtClean="0"/>
-              <a:t>[]::new</a:t>
-            </a:r>
+            <a:endParaRPr lang="en-US" altLang="zh-CN" dirty="0"/>
+          </a:p>
+          <a:p>
             <a:endParaRPr lang="zh-CN" altLang="en-US" dirty="0"/>
           </a:p>
         </p:txBody>
@@ -6078,6 +6138,174 @@
           <a:p>
             <a:r>
               <a:rPr lang="en-US" altLang="zh-CN" dirty="0" smtClean="0"/>
+              <a:t>Method reference</a:t>
+            </a:r>
+            <a:endParaRPr lang="zh-CN" altLang="en-US" dirty="0"/>
+          </a:p>
+        </p:txBody>
+      </p:sp>
+      <p:sp>
+        <p:nvSpPr>
+          <p:cNvPr id="3" name="内容占位符 2"/>
+          <p:cNvSpPr>
+            <a:spLocks noGrp="1"/>
+          </p:cNvSpPr>
+          <p:nvPr>
+            <p:ph idx="1"/>
+          </p:nvPr>
+        </p:nvSpPr>
+        <p:spPr/>
+        <p:txBody>
+          <a:bodyPr/>
+          <a:lstStyle/>
+          <a:p>
+            <a:r>
+              <a:rPr lang="zh-CN" altLang="en-US" dirty="0" smtClean="0"/>
+              <a:t>静态方法引用： </a:t>
+            </a:r>
+            <a:r>
+              <a:rPr lang="en-US" altLang="zh-CN" dirty="0" err="1" smtClean="0"/>
+              <a:t>ClassName</a:t>
+            </a:r>
+            <a:r>
+              <a:rPr lang="en-US" altLang="zh-CN" dirty="0" smtClean="0"/>
+              <a:t>::</a:t>
+            </a:r>
+            <a:r>
+              <a:rPr lang="en-US" altLang="zh-CN" dirty="0" err="1" smtClean="0"/>
+              <a:t>methodName</a:t>
+            </a:r>
+            <a:endParaRPr lang="en-US" altLang="zh-CN" dirty="0" smtClean="0"/>
+          </a:p>
+          <a:p>
+            <a:r>
+              <a:rPr lang="zh-CN" altLang="en-US" dirty="0" smtClean="0"/>
+              <a:t>实例上的实例方法引用： </a:t>
+            </a:r>
+            <a:r>
+              <a:rPr lang="en-US" altLang="zh-CN" dirty="0" err="1" smtClean="0"/>
+              <a:t>instanceReference</a:t>
+            </a:r>
+            <a:r>
+              <a:rPr lang="en-US" altLang="zh-CN" dirty="0" smtClean="0"/>
+              <a:t>::</a:t>
+            </a:r>
+            <a:r>
+              <a:rPr lang="en-US" altLang="zh-CN" dirty="0" err="1" smtClean="0"/>
+              <a:t>methodName</a:t>
+            </a:r>
+            <a:endParaRPr lang="en-US" altLang="zh-CN" dirty="0" smtClean="0"/>
+          </a:p>
+          <a:p>
+            <a:r>
+              <a:rPr lang="zh-CN" altLang="en-US" dirty="0" smtClean="0"/>
+              <a:t>超类上的实例方法引用： </a:t>
+            </a:r>
+            <a:r>
+              <a:rPr lang="en-US" altLang="zh-CN" dirty="0" smtClean="0"/>
+              <a:t>super::</a:t>
+            </a:r>
+            <a:r>
+              <a:rPr lang="en-US" altLang="zh-CN" dirty="0" err="1" smtClean="0"/>
+              <a:t>methodName</a:t>
+            </a:r>
+            <a:endParaRPr lang="en-US" altLang="zh-CN" dirty="0" smtClean="0"/>
+          </a:p>
+          <a:p>
+            <a:r>
+              <a:rPr lang="zh-CN" altLang="en-US" dirty="0" smtClean="0"/>
+              <a:t>类型上的实例方法引用： </a:t>
+            </a:r>
+            <a:r>
+              <a:rPr lang="en-US" altLang="zh-CN" dirty="0" err="1" smtClean="0"/>
+              <a:t>ClassName</a:t>
+            </a:r>
+            <a:r>
+              <a:rPr lang="en-US" altLang="zh-CN" dirty="0" smtClean="0"/>
+              <a:t>::</a:t>
+            </a:r>
+            <a:r>
+              <a:rPr lang="en-US" altLang="zh-CN" dirty="0" err="1" smtClean="0"/>
+              <a:t>methodName</a:t>
+            </a:r>
+            <a:endParaRPr lang="en-US" altLang="zh-CN" dirty="0" smtClean="0"/>
+          </a:p>
+          <a:p>
+            <a:r>
+              <a:rPr lang="zh-CN" altLang="en-US" dirty="0" smtClean="0"/>
+              <a:t>构造方法引用： </a:t>
+            </a:r>
+            <a:r>
+              <a:rPr lang="en-US" altLang="zh-CN" dirty="0" smtClean="0"/>
+              <a:t>Class::new</a:t>
+            </a:r>
+          </a:p>
+          <a:p>
+            <a:r>
+              <a:rPr lang="zh-CN" altLang="en-US" dirty="0" smtClean="0"/>
+              <a:t>数组构造方法引用：</a:t>
+            </a:r>
+            <a:r>
+              <a:rPr lang="en-US" altLang="zh-CN" dirty="0" err="1" smtClean="0"/>
+              <a:t>TypeName</a:t>
+            </a:r>
+            <a:r>
+              <a:rPr lang="en-US" altLang="zh-CN" dirty="0" smtClean="0"/>
+              <a:t>[]::new</a:t>
+            </a:r>
+            <a:endParaRPr lang="zh-CN" altLang="en-US" dirty="0"/>
+          </a:p>
+        </p:txBody>
+      </p:sp>
+    </p:spTree>
+  </p:cSld>
+  <p:clrMapOvr>
+    <a:masterClrMapping/>
+  </p:clrMapOvr>
+  <p:timing>
+    <p:tnLst>
+      <p:par>
+        <p:cTn id="1" dur="indefinite" restart="never" nodeType="tmRoot"/>
+      </p:par>
+    </p:tnLst>
+  </p:timing>
+</p:sld>
+</file>
+
+<file path=ppt/slides/slide16.xml><?xml version="1.0" encoding="utf-8"?>
+<p:sld xmlns:a="http://schemas.openxmlformats.org/drawingml/2006/main" xmlns:r="http://schemas.openxmlformats.org/officeDocument/2006/relationships" xmlns:p="http://schemas.openxmlformats.org/presentationml/2006/main">
+  <p:cSld>
+    <p:spTree>
+      <p:nvGrpSpPr>
+        <p:cNvPr id="1" name=""/>
+        <p:cNvGrpSpPr/>
+        <p:nvPr/>
+      </p:nvGrpSpPr>
+      <p:grpSpPr>
+        <a:xfrm>
+          <a:off x="0" y="0"/>
+          <a:ext cx="0" cy="0"/>
+          <a:chOff x="0" y="0"/>
+          <a:chExt cx="0" cy="0"/>
+        </a:xfrm>
+      </p:grpSpPr>
+      <p:sp>
+        <p:nvSpPr>
+          <p:cNvPr id="2" name="标题 1"/>
+          <p:cNvSpPr>
+            <a:spLocks noGrp="1"/>
+          </p:cNvSpPr>
+          <p:nvPr>
+            <p:ph type="title"/>
+          </p:nvPr>
+        </p:nvSpPr>
+        <p:spPr/>
+        <p:txBody>
+          <a:bodyPr/>
+          <a:lstStyle/>
+          <a:p>
+            <a:r>
+              <a:rPr lang="en-US" altLang="zh-CN" dirty="0" smtClean="0"/>
               <a:t>Stream</a:t>
             </a:r>
             <a:endParaRPr lang="zh-CN" altLang="en-US" dirty="0"/>
@@ -6116,7 +6344,7 @@
           <p:nvPr/>
         </p:nvPicPr>
         <p:blipFill>
-          <a:blip r:embed="rId1">
+          <a:blip r:embed="rId3">
             <a:extLst>
               <a:ext uri="{28A0092B-C50C-407E-A947-70E740481C1C}">
                 <a14:useLocalDpi xmlns:a14="http://schemas.microsoft.com/office/drawing/2010/main" val="0"/>
@@ -6152,7 +6380,7 @@
 </p:sld>
 </file>
 
-<file path=ppt/slides/slide16.xml><?xml version="1.0" encoding="utf-8"?>
+<file path=ppt/slides/slide17.xml><?xml version="1.0" encoding="utf-8"?>
 <p:sld xmlns:a="http://schemas.openxmlformats.org/drawingml/2006/main" xmlns:r="http://schemas.openxmlformats.org/officeDocument/2006/relationships" xmlns:p="http://schemas.openxmlformats.org/presentationml/2006/main">
   <p:cSld>
     <p:spTree>
@@ -6218,7 +6446,6 @@
               <a:rPr lang="en-US" altLang="zh-CN" sz="2000" dirty="0" smtClean="0"/>
               <a:t>Predicate</a:t>
             </a:r>
-            <a:endParaRPr lang="en-US" altLang="zh-CN" sz="2000" dirty="0" smtClean="0"/>
           </a:p>
           <a:p>
             <a:r>
@@ -6866,7 +7093,6 @@
               <a:rPr lang="en-US" altLang="zh-CN" sz="2000" dirty="0" smtClean="0"/>
               <a:t>Function</a:t>
             </a:r>
-            <a:endParaRPr lang="en-US" altLang="zh-CN" sz="2000" dirty="0" smtClean="0"/>
           </a:p>
           <a:p>
             <a:r>
@@ -7271,7 +7497,6 @@
               <a:rPr lang="en-US" altLang="zh-CN" sz="2000" dirty="0" smtClean="0"/>
               <a:t>Consumer</a:t>
             </a:r>
-            <a:endParaRPr lang="en-US" altLang="zh-CN" sz="2000" dirty="0" smtClean="0"/>
           </a:p>
           <a:p>
             <a:r>
@@ -7505,7 +7730,7 @@
         </p:spPr>
         <p:txBody>
           <a:bodyPr vert="horz" lIns="91440" tIns="45720" rIns="91440" bIns="45720" rtlCol="0">
-            <a:normAutofit/>
+            <a:normAutofit fontScale="92500"/>
           </a:bodyPr>
           <a:lstStyle>
             <a:lvl1pPr marL="228600" indent="-228600" algn="l" defTabSz="914400" rtl="0" eaLnBrk="1" latinLnBrk="0" hangingPunct="1">
@@ -7676,7 +7901,6 @@
               <a:rPr lang="en-US" altLang="zh-CN" sz="2000" dirty="0" smtClean="0"/>
               <a:t>Supplier</a:t>
             </a:r>
-            <a:endParaRPr lang="en-US" altLang="zh-CN" sz="2000" dirty="0" smtClean="0"/>
           </a:p>
           <a:p>
             <a:r>
@@ -7716,7 +7940,7 @@
 </p:sld>
 </file>
 
-<file path=ppt/slides/slide17.xml><?xml version="1.0" encoding="utf-8"?>
+<file path=ppt/slides/slide18.xml><?xml version="1.0" encoding="utf-8"?>
 <p:sld xmlns:a="http://schemas.openxmlformats.org/drawingml/2006/main" xmlns:r="http://schemas.openxmlformats.org/officeDocument/2006/relationships" xmlns:p="http://schemas.openxmlformats.org/presentationml/2006/main">
   <p:cSld>
     <p:spTree>
@@ -7783,7 +8007,6 @@
               <a:rPr lang="en-US" altLang="zh-CN" dirty="0"/>
               <a:t>Predicate</a:t>
             </a:r>
-            <a:endParaRPr lang="en-US" altLang="zh-CN" dirty="0"/>
           </a:p>
           <a:p>
             <a:pPr lvl="1"/>
@@ -7835,7 +8058,7 @@
 </p:sld>
 </file>
 
-<file path=ppt/slides/slide18.xml><?xml version="1.0" encoding="utf-8"?>
+<file path=ppt/slides/slide19.xml><?xml version="1.0" encoding="utf-8"?>
 <p:sld xmlns:a="http://schemas.openxmlformats.org/drawingml/2006/main" xmlns:r="http://schemas.openxmlformats.org/officeDocument/2006/relationships" xmlns:p="http://schemas.openxmlformats.org/presentationml/2006/main">
   <p:cSld>
     <p:spTree>
@@ -8189,137 +8412,6 @@
 </p:sld>
 </file>
 
-<file path=ppt/slides/slide19.xml><?xml version="1.0" encoding="utf-8"?>
-<p:sld xmlns:a="http://schemas.openxmlformats.org/drawingml/2006/main" xmlns:r="http://schemas.openxmlformats.org/officeDocument/2006/relationships" xmlns:p="http://schemas.openxmlformats.org/presentationml/2006/main">
-  <p:cSld>
-    <p:spTree>
-      <p:nvGrpSpPr>
-        <p:cNvPr id="1" name=""/>
-        <p:cNvGrpSpPr/>
-        <p:nvPr/>
-      </p:nvGrpSpPr>
-      <p:grpSpPr>
-        <a:xfrm>
-          <a:off x="0" y="0"/>
-          <a:ext cx="0" cy="0"/>
-          <a:chOff x="0" y="0"/>
-          <a:chExt cx="0" cy="0"/>
-        </a:xfrm>
-      </p:grpSpPr>
-      <p:sp>
-        <p:nvSpPr>
-          <p:cNvPr id="2" name="标题 1"/>
-          <p:cNvSpPr>
-            <a:spLocks noGrp="1"/>
-          </p:cNvSpPr>
-          <p:nvPr>
-            <p:ph type="title"/>
-          </p:nvPr>
-        </p:nvSpPr>
-        <p:spPr/>
-        <p:txBody>
-          <a:bodyPr/>
-          <a:lstStyle/>
-          <a:p>
-            <a:r>
-              <a:rPr lang="en-US" altLang="zh-CN" dirty="0" smtClean="0"/>
-              <a:t>Interfaces Introduction</a:t>
-            </a:r>
-            <a:endParaRPr lang="zh-CN" altLang="en-US" dirty="0"/>
-          </a:p>
-        </p:txBody>
-      </p:sp>
-      <p:sp>
-        <p:nvSpPr>
-          <p:cNvPr id="3" name="内容占位符 2"/>
-          <p:cNvSpPr>
-            <a:spLocks noGrp="1"/>
-          </p:cNvSpPr>
-          <p:nvPr>
-            <p:ph idx="1"/>
-          </p:nvPr>
-        </p:nvSpPr>
-        <p:spPr/>
-        <p:txBody>
-          <a:bodyPr/>
-          <a:lstStyle/>
-          <a:p>
-            <a:r>
-              <a:rPr lang="zh-CN" altLang="en-US" dirty="0" smtClean="0"/>
-              <a:t>函数接口（单元，二元）和操作接口（单元，二元）类似，都是接收一个或两个参数进行处理返回，但函数接口并不要求返回参数类型与入参类型一致。</a:t>
-            </a:r>
-            <a:endParaRPr lang="en-US" altLang="zh-CN" dirty="0" smtClean="0"/>
-          </a:p>
-          <a:p>
-            <a:endParaRPr lang="en-US" altLang="zh-CN" dirty="0" smtClean="0"/>
-          </a:p>
-          <a:p>
-            <a:pPr lvl="1"/>
-            <a:r>
-              <a:rPr lang="en-US" altLang="zh-CN" dirty="0"/>
-              <a:t>Function</a:t>
-            </a:r>
-            <a:endParaRPr lang="en-US" altLang="zh-CN" dirty="0"/>
-          </a:p>
-          <a:p>
-            <a:pPr lvl="1"/>
-            <a:r>
-              <a:rPr lang="en-US" altLang="zh-CN" dirty="0" err="1"/>
-              <a:t>IntFunction</a:t>
-            </a:r>
-            <a:endParaRPr lang="en-US" altLang="zh-CN" dirty="0"/>
-          </a:p>
-          <a:p>
-            <a:pPr lvl="1"/>
-            <a:r>
-              <a:rPr lang="en-US" altLang="zh-CN" dirty="0" err="1"/>
-              <a:t>LongFunction</a:t>
-            </a:r>
-            <a:endParaRPr lang="en-US" altLang="zh-CN" dirty="0"/>
-          </a:p>
-          <a:p>
-            <a:pPr lvl="1"/>
-            <a:r>
-              <a:rPr lang="en-US" altLang="zh-CN" dirty="0" err="1" smtClean="0"/>
-              <a:t>DoubleFunction</a:t>
-            </a:r>
-            <a:endParaRPr lang="en-US" altLang="zh-CN" dirty="0" smtClean="0"/>
-          </a:p>
-          <a:p>
-            <a:pPr lvl="1"/>
-            <a:endParaRPr lang="en-US" altLang="zh-CN" dirty="0"/>
-          </a:p>
-          <a:p>
-            <a:pPr lvl="1"/>
-            <a:r>
-              <a:rPr lang="en-US" altLang="zh-CN" dirty="0" err="1"/>
-              <a:t>BiFunction</a:t>
-            </a:r>
-            <a:endParaRPr lang="zh-CN" altLang="en-US" dirty="0"/>
-          </a:p>
-          <a:p>
-            <a:endParaRPr lang="en-US" altLang="zh-CN" dirty="0" smtClean="0"/>
-          </a:p>
-          <a:p>
-            <a:endParaRPr lang="zh-CN" altLang="en-US" dirty="0"/>
-          </a:p>
-        </p:txBody>
-      </p:sp>
-    </p:spTree>
-  </p:cSld>
-  <p:clrMapOvr>
-    <a:masterClrMapping/>
-  </p:clrMapOvr>
-  <p:timing>
-    <p:tnLst>
-      <p:par>
-        <p:cTn id="1" dur="indefinite" restart="never" nodeType="tmRoot"/>
-      </p:par>
-    </p:tnLst>
-  </p:timing>
-</p:sld>
-</file>
-
 <file path=ppt/slides/slide2.xml><?xml version="1.0" encoding="utf-8"?>
 <p:sld xmlns:a="http://schemas.openxmlformats.org/drawingml/2006/main" xmlns:r="http://schemas.openxmlformats.org/officeDocument/2006/relationships" xmlns:p="http://schemas.openxmlformats.org/presentationml/2006/main">
   <p:cSld>
@@ -8352,10 +8444,6 @@
           <a:bodyPr/>
           <a:lstStyle/>
           <a:p>
-            <a:r>
-              <a:rPr lang="en-US" altLang="zh-CN" dirty="0" smtClean="0"/>
-              <a:t>Programming Paradigm</a:t>
-            </a:r>
             <a:endParaRPr lang="zh-CN" altLang="en-US" dirty="0"/>
           </a:p>
         </p:txBody>
@@ -8375,46 +8463,20 @@
           <a:bodyPr/>
           <a:lstStyle/>
           <a:p>
-            <a:r>
-              <a:rPr lang="en-US" altLang="zh-CN" dirty="0" smtClean="0"/>
-              <a:t>Function Programming Paradigm</a:t>
-            </a:r>
-            <a:endParaRPr lang="en-US" altLang="zh-CN" dirty="0" smtClean="0"/>
-          </a:p>
-          <a:p>
-            <a:endParaRPr lang="en-US" altLang="zh-CN" dirty="0" smtClean="0"/>
-          </a:p>
-          <a:p>
-            <a:r>
-              <a:rPr lang="en-US" altLang="zh-CN" dirty="0" smtClean="0"/>
-              <a:t>Object Oriented Programming Paradigm</a:t>
-            </a:r>
-            <a:endParaRPr lang="en-US" altLang="zh-CN" dirty="0" smtClean="0"/>
-          </a:p>
-          <a:p>
-            <a:endParaRPr lang="en-US" altLang="zh-CN" dirty="0" smtClean="0"/>
-          </a:p>
-          <a:p>
-            <a:r>
-              <a:rPr lang="en-US" altLang="zh-CN" dirty="0" smtClean="0"/>
-              <a:t>Aspect Oriented Programming Paradigm</a:t>
-            </a:r>
-            <a:endParaRPr lang="zh-CN" altLang="en-US" dirty="0"/>
+            <a:endParaRPr lang="zh-CN" altLang="en-US"/>
           </a:p>
         </p:txBody>
       </p:sp>
     </p:spTree>
+    <p:extLst>
+      <p:ext uri="{BB962C8B-B14F-4D97-AF65-F5344CB8AC3E}">
+        <p14:creationId xmlns:p14="http://schemas.microsoft.com/office/powerpoint/2010/main" val="2670791045"/>
+      </p:ext>
+    </p:extLst>
   </p:cSld>
   <p:clrMapOvr>
     <a:masterClrMapping/>
   </p:clrMapOvr>
-  <p:timing>
-    <p:tnLst>
-      <p:par>
-        <p:cTn id="1" dur="indefinite" restart="never" nodeType="tmRoot"/>
-      </p:par>
-    </p:tnLst>
-  </p:timing>
 </p:sld>
 </file>
 
@@ -8475,23 +8537,25 @@
           <a:p>
             <a:r>
               <a:rPr lang="zh-CN" altLang="en-US" dirty="0" smtClean="0"/>
-              <a:t>消费者接口与函数接口类似，但返回</a:t>
-            </a:r>
-            <a:r>
-              <a:rPr lang="en-US" altLang="zh-CN" dirty="0" smtClean="0"/>
-              <a:t>void</a:t>
-            </a:r>
-            <a:r>
-              <a:rPr lang="zh-CN" altLang="en-US" dirty="0" smtClean="0"/>
-              <a:t>类型。</a:t>
+              <a:t>函数接口（单元，二元）和操作接口（单元，二元）类似，都是接收一个或两个参数进行处理返回，但函数接口并不要求返回参数类型与入参类型一致。</a:t>
             </a:r>
             <a:endParaRPr lang="en-US" altLang="zh-CN" dirty="0" smtClean="0"/>
           </a:p>
           <a:p>
+            <a:endParaRPr lang="en-US" altLang="zh-CN" dirty="0" smtClean="0"/>
+          </a:p>
+          <a:p>
             <a:pPr lvl="1"/>
             <a:r>
               <a:rPr lang="en-US" altLang="zh-CN" dirty="0"/>
-              <a:t>Consumer</a:t>
+              <a:t>Function</a:t>
+            </a:r>
+          </a:p>
+          <a:p>
+            <a:pPr lvl="1"/>
+            <a:r>
+              <a:rPr lang="en-US" altLang="zh-CN" dirty="0" err="1"/>
+              <a:t>IntFunction</a:t>
             </a:r>
             <a:endParaRPr lang="en-US" altLang="zh-CN" dirty="0"/>
           </a:p>
@@ -8499,23 +8563,15 @@
             <a:pPr lvl="1"/>
             <a:r>
               <a:rPr lang="en-US" altLang="zh-CN" dirty="0" err="1"/>
-              <a:t>LongConsumer</a:t>
+              <a:t>LongFunction</a:t>
             </a:r>
             <a:endParaRPr lang="en-US" altLang="zh-CN" dirty="0"/>
           </a:p>
           <a:p>
             <a:pPr lvl="1"/>
             <a:r>
-              <a:rPr lang="en-US" altLang="zh-CN" dirty="0" err="1"/>
-              <a:t>IntConsumer</a:t>
-            </a:r>
-            <a:endParaRPr lang="en-US" altLang="zh-CN" dirty="0"/>
-          </a:p>
-          <a:p>
-            <a:pPr lvl="1"/>
-            <a:r>
               <a:rPr lang="en-US" altLang="zh-CN" dirty="0" err="1" smtClean="0"/>
-              <a:t>DoubleConsumer</a:t>
+              <a:t>DoubleFunction</a:t>
             </a:r>
             <a:endParaRPr lang="en-US" altLang="zh-CN" dirty="0" smtClean="0"/>
           </a:p>
@@ -8527,9 +8583,12 @@
             <a:pPr lvl="1"/>
             <a:r>
               <a:rPr lang="en-US" altLang="zh-CN" dirty="0" err="1"/>
-              <a:t>BiConsumer</a:t>
+              <a:t>BiFunction</a:t>
             </a:r>
             <a:endParaRPr lang="zh-CN" altLang="en-US" dirty="0"/>
+          </a:p>
+          <a:p>
+            <a:endParaRPr lang="en-US" altLang="zh-CN" dirty="0" smtClean="0"/>
           </a:p>
           <a:p>
             <a:endParaRPr lang="zh-CN" altLang="en-US" dirty="0"/>
@@ -8541,6 +8600,13 @@
   <p:clrMapOvr>
     <a:masterClrMapping/>
   </p:clrMapOvr>
+  <p:timing>
+    <p:tnLst>
+      <p:par>
+        <p:cTn id="1" dur="indefinite" restart="never" nodeType="tmRoot"/>
+      </p:par>
+    </p:tnLst>
+  </p:timing>
 </p:sld>
 </file>
 
@@ -8601,42 +8667,58 @@
           <a:p>
             <a:r>
               <a:rPr lang="zh-CN" altLang="en-US" dirty="0" smtClean="0"/>
-              <a:t>工厂接口（供应商接口），与函数接口类似但没有入参</a:t>
+              <a:t>消费者接口与函数接口类似，但返回</a:t>
+            </a:r>
+            <a:r>
+              <a:rPr lang="en-US" altLang="zh-CN" dirty="0" smtClean="0"/>
+              <a:t>void</a:t>
+            </a:r>
+            <a:r>
+              <a:rPr lang="zh-CN" altLang="en-US" dirty="0" smtClean="0"/>
+              <a:t>类型。</a:t>
             </a:r>
             <a:endParaRPr lang="en-US" altLang="zh-CN" dirty="0" smtClean="0"/>
           </a:p>
           <a:p>
+            <a:pPr lvl="1"/>
+            <a:r>
+              <a:rPr lang="en-US" altLang="zh-CN" dirty="0"/>
+              <a:t>Consumer</a:t>
+            </a:r>
+          </a:p>
+          <a:p>
+            <a:pPr lvl="1"/>
+            <a:r>
+              <a:rPr lang="en-US" altLang="zh-CN" dirty="0" err="1"/>
+              <a:t>LongConsumer</a:t>
+            </a:r>
+            <a:endParaRPr lang="en-US" altLang="zh-CN" dirty="0"/>
+          </a:p>
+          <a:p>
+            <a:pPr lvl="1"/>
+            <a:r>
+              <a:rPr lang="en-US" altLang="zh-CN" dirty="0" err="1"/>
+              <a:t>IntConsumer</a:t>
+            </a:r>
+            <a:endParaRPr lang="en-US" altLang="zh-CN" dirty="0"/>
+          </a:p>
+          <a:p>
+            <a:pPr lvl="1"/>
+            <a:r>
+              <a:rPr lang="en-US" altLang="zh-CN" dirty="0" err="1" smtClean="0"/>
+              <a:t>DoubleConsumer</a:t>
+            </a:r>
             <a:endParaRPr lang="en-US" altLang="zh-CN" dirty="0" smtClean="0"/>
           </a:p>
           <a:p>
             <a:pPr lvl="1"/>
-            <a:r>
-              <a:rPr lang="en-US" altLang="zh-CN" dirty="0"/>
-              <a:t>Supplier</a:t>
-            </a:r>
             <a:endParaRPr lang="en-US" altLang="zh-CN" dirty="0"/>
           </a:p>
           <a:p>
             <a:pPr lvl="1"/>
             <a:r>
               <a:rPr lang="en-US" altLang="zh-CN" dirty="0" err="1"/>
-              <a:t>IntSupplier</a:t>
-            </a:r>
-            <a:endParaRPr lang="en-US" altLang="zh-CN" dirty="0"/>
-          </a:p>
-          <a:p>
-            <a:pPr lvl="1"/>
-            <a:r>
-              <a:rPr lang="en-US" altLang="zh-CN" dirty="0" err="1"/>
-              <a:t>LongSupplier</a:t>
-            </a:r>
-            <a:endParaRPr lang="en-US" altLang="zh-CN" dirty="0"/>
-          </a:p>
-          <a:p>
-            <a:pPr lvl="1"/>
-            <a:r>
-              <a:rPr lang="en-US" altLang="zh-CN" dirty="0" err="1"/>
-              <a:t>DoubleSupplier</a:t>
+              <a:t>BiConsumer</a:t>
             </a:r>
             <a:endParaRPr lang="zh-CN" altLang="en-US" dirty="0"/>
           </a:p>
@@ -8686,8 +8768,8 @@
           <a:lstStyle/>
           <a:p>
             <a:r>
-              <a:rPr lang="en-US" altLang="zh-CN" dirty="0" err="1" smtClean="0"/>
-              <a:t>ForEach</a:t>
+              <a:rPr lang="en-US" altLang="zh-CN" dirty="0" smtClean="0"/>
+              <a:t>Interfaces Introduction</a:t>
             </a:r>
             <a:endParaRPr lang="zh-CN" altLang="en-US" dirty="0"/>
           </a:p>
@@ -8709,91 +8791,42 @@
           <a:lstStyle/>
           <a:p>
             <a:r>
-              <a:rPr lang="en-US" altLang="zh-CN" dirty="0" smtClean="0"/>
-              <a:t>Iterator elements of a stream.</a:t>
+              <a:rPr lang="zh-CN" altLang="en-US" dirty="0" smtClean="0"/>
+              <a:t>工厂接口（供应商接口），与函数接口类似但没有入参</a:t>
             </a:r>
             <a:endParaRPr lang="en-US" altLang="zh-CN" dirty="0" smtClean="0"/>
           </a:p>
           <a:p>
-            <a:endParaRPr lang="en-US" altLang="zh-CN" b="1" dirty="0" smtClean="0"/>
-          </a:p>
-          <a:p>
-            <a:pPr marL="0" indent="0">
-              <a:buNone/>
-            </a:pPr>
-            <a:r>
-              <a:rPr lang="en-US" altLang="zh-CN" b="1" dirty="0" smtClean="0"/>
-              <a:t>public </a:t>
-            </a:r>
-            <a:r>
-              <a:rPr lang="en-US" altLang="zh-CN" b="1" dirty="0"/>
-              <a:t>interface </a:t>
-            </a:r>
+            <a:endParaRPr lang="en-US" altLang="zh-CN" dirty="0" smtClean="0"/>
+          </a:p>
+          <a:p>
+            <a:pPr lvl="1"/>
             <a:r>
               <a:rPr lang="en-US" altLang="zh-CN" dirty="0"/>
-              <a:t>Stream&lt;T&gt; </a:t>
-            </a:r>
-            <a:r>
-              <a:rPr lang="en-US" altLang="zh-CN" b="1" dirty="0"/>
-              <a:t>extends </a:t>
-            </a:r>
+              <a:t>Supplier</a:t>
+            </a:r>
+          </a:p>
+          <a:p>
+            <a:pPr lvl="1"/>
             <a:r>
               <a:rPr lang="en-US" altLang="zh-CN" dirty="0" err="1"/>
-              <a:t>BaseStream</a:t>
-            </a:r>
-            <a:r>
-              <a:rPr lang="en-US" altLang="zh-CN" dirty="0"/>
-              <a:t>&lt;T, Stream&lt;T</a:t>
-            </a:r>
-            <a:r>
-              <a:rPr lang="en-US" altLang="zh-CN" dirty="0" smtClean="0"/>
-              <a:t>&gt;&gt; { </a:t>
+              <a:t>IntSupplier</a:t>
             </a:r>
             <a:endParaRPr lang="en-US" altLang="zh-CN" dirty="0"/>
           </a:p>
           <a:p>
-            <a:endParaRPr lang="en-US" altLang="zh-CN" b="1" dirty="0"/>
-          </a:p>
-          <a:p>
-            <a:pPr marL="0" indent="0">
-              <a:buNone/>
-            </a:pPr>
-            <a:r>
-              <a:rPr lang="en-US" altLang="zh-CN" b="1" dirty="0"/>
-              <a:t>    void </a:t>
-            </a:r>
+            <a:pPr lvl="1"/>
             <a:r>
               <a:rPr lang="en-US" altLang="zh-CN" dirty="0" err="1"/>
-              <a:t>forEach</a:t>
-            </a:r>
-            <a:r>
-              <a:rPr lang="en-US" altLang="zh-CN" dirty="0"/>
-              <a:t>(Consumer&lt;? </a:t>
-            </a:r>
-            <a:r>
-              <a:rPr lang="en-US" altLang="zh-CN" b="1" dirty="0"/>
-              <a:t>super </a:t>
-            </a:r>
-            <a:r>
-              <a:rPr lang="en-US" altLang="zh-CN" dirty="0"/>
-              <a:t>T&gt; action</a:t>
-            </a:r>
-            <a:r>
-              <a:rPr lang="en-US" altLang="zh-CN" dirty="0" smtClean="0"/>
-              <a:t>);</a:t>
-            </a:r>
-            <a:endParaRPr lang="en-US" altLang="zh-CN" dirty="0" smtClean="0"/>
-          </a:p>
-          <a:p>
+              <a:t>LongSupplier</a:t>
+            </a:r>
             <a:endParaRPr lang="en-US" altLang="zh-CN" dirty="0"/>
           </a:p>
           <a:p>
-            <a:pPr marL="0" indent="0">
-              <a:buNone/>
-            </a:pPr>
-            <a:r>
-              <a:rPr lang="en-US" altLang="zh-CN" dirty="0" smtClean="0"/>
-              <a:t>}</a:t>
+            <a:pPr lvl="1"/>
+            <a:r>
+              <a:rPr lang="en-US" altLang="zh-CN" dirty="0" err="1"/>
+              <a:t>DoubleSupplier</a:t>
             </a:r>
             <a:endParaRPr lang="zh-CN" altLang="en-US" dirty="0"/>
           </a:p>
@@ -8843,38 +8876,71 @@
           <a:lstStyle/>
           <a:p>
             <a:r>
+              <a:rPr lang="en-US" altLang="zh-CN" dirty="0" err="1" smtClean="0"/>
+              <a:t>ForEach</a:t>
+            </a:r>
+            <a:endParaRPr lang="zh-CN" altLang="en-US" dirty="0"/>
+          </a:p>
+        </p:txBody>
+      </p:sp>
+      <p:sp>
+        <p:nvSpPr>
+          <p:cNvPr id="3" name="内容占位符 2"/>
+          <p:cNvSpPr>
+            <a:spLocks noGrp="1"/>
+          </p:cNvSpPr>
+          <p:nvPr>
+            <p:ph idx="1"/>
+          </p:nvPr>
+        </p:nvSpPr>
+        <p:spPr/>
+        <p:txBody>
+          <a:bodyPr/>
+          <a:lstStyle/>
+          <a:p>
+            <a:r>
               <a:rPr lang="en-US" altLang="zh-CN" dirty="0" smtClean="0"/>
-              <a:t>filter</a:t>
-            </a:r>
-            <a:endParaRPr lang="zh-CN" altLang="en-US" dirty="0"/>
-          </a:p>
-        </p:txBody>
-      </p:sp>
-      <p:sp>
-        <p:nvSpPr>
-          <p:cNvPr id="3" name="内容占位符 2"/>
-          <p:cNvSpPr>
-            <a:spLocks noGrp="1"/>
-          </p:cNvSpPr>
-          <p:nvPr>
-            <p:ph idx="1"/>
-          </p:nvPr>
-        </p:nvSpPr>
-        <p:spPr/>
-        <p:txBody>
-          <a:bodyPr/>
-          <a:lstStyle/>
-          <a:p>
-            <a:r>
-              <a:rPr lang="en-US" altLang="zh-CN" dirty="0" smtClean="0"/>
-              <a:t>Filter and process elements of a stream.</a:t>
-            </a:r>
-            <a:endParaRPr lang="en-US" altLang="zh-CN" dirty="0" smtClean="0"/>
+              <a:t>Iterator elements of a stream.</a:t>
+            </a:r>
+          </a:p>
+          <a:p>
+            <a:endParaRPr lang="en-US" altLang="zh-CN" b="1" dirty="0" smtClean="0"/>
           </a:p>
           <a:p>
             <a:pPr marL="0" indent="0">
               <a:buNone/>
             </a:pPr>
+            <a:r>
+              <a:rPr lang="en-US" altLang="zh-CN" b="1" dirty="0" smtClean="0"/>
+              <a:t>public </a:t>
+            </a:r>
+            <a:r>
+              <a:rPr lang="en-US" altLang="zh-CN" b="1" dirty="0"/>
+              <a:t>interface </a:t>
+            </a:r>
+            <a:r>
+              <a:rPr lang="en-US" altLang="zh-CN" dirty="0"/>
+              <a:t>Stream&lt;T&gt; </a:t>
+            </a:r>
+            <a:r>
+              <a:rPr lang="en-US" altLang="zh-CN" b="1" dirty="0"/>
+              <a:t>extends </a:t>
+            </a:r>
+            <a:r>
+              <a:rPr lang="en-US" altLang="zh-CN" dirty="0" err="1"/>
+              <a:t>BaseStream</a:t>
+            </a:r>
+            <a:r>
+              <a:rPr lang="en-US" altLang="zh-CN" dirty="0"/>
+              <a:t>&lt;T, Stream&lt;T</a:t>
+            </a:r>
+            <a:r>
+              <a:rPr lang="en-US" altLang="zh-CN" dirty="0" smtClean="0"/>
+              <a:t>&gt;&gt; { </a:t>
+            </a:r>
+            <a:endParaRPr lang="en-US" altLang="zh-CN" dirty="0"/>
+          </a:p>
+          <a:p>
             <a:endParaRPr lang="en-US" altLang="zh-CN" b="1" dirty="0"/>
           </a:p>
           <a:p>
@@ -8882,69 +8948,39 @@
               <a:buNone/>
             </a:pPr>
             <a:r>
-              <a:rPr lang="en-US" altLang="zh-CN" b="1" dirty="0" smtClean="0"/>
-              <a:t>public </a:t>
-            </a:r>
-            <a:r>
               <a:rPr lang="en-US" altLang="zh-CN" b="1" dirty="0"/>
-              <a:t>interface </a:t>
+              <a:t>    void </a:t>
+            </a:r>
+            <a:r>
+              <a:rPr lang="en-US" altLang="zh-CN" dirty="0" err="1"/>
+              <a:t>forEach</a:t>
             </a:r>
             <a:r>
               <a:rPr lang="en-US" altLang="zh-CN" dirty="0"/>
-              <a:t>Stream&lt;T&gt; </a:t>
+              <a:t>(Consumer&lt;? </a:t>
             </a:r>
             <a:r>
               <a:rPr lang="en-US" altLang="zh-CN" b="1" dirty="0"/>
-              <a:t>extends </a:t>
-            </a:r>
-            <a:r>
-              <a:rPr lang="en-US" altLang="zh-CN" dirty="0" err="1"/>
-              <a:t>BaseStream</a:t>
+              <a:t>super </a:t>
             </a:r>
             <a:r>
               <a:rPr lang="en-US" altLang="zh-CN" dirty="0"/>
-              <a:t>&lt;T, Stream&lt;T&gt;&gt; { </a:t>
-            </a:r>
+              <a:t>T&gt; action</a:t>
+            </a:r>
+            <a:r>
+              <a:rPr lang="en-US" altLang="zh-CN" dirty="0" smtClean="0"/>
+              <a:t>);</a:t>
+            </a:r>
+          </a:p>
+          <a:p>
             <a:endParaRPr lang="en-US" altLang="zh-CN" dirty="0"/>
-          </a:p>
-          <a:p>
-            <a:endParaRPr lang="en-US" altLang="zh-CN" b="1" dirty="0"/>
           </a:p>
           <a:p>
             <a:pPr marL="0" indent="0">
               <a:buNone/>
             </a:pPr>
             <a:r>
-              <a:rPr lang="en-US" altLang="zh-CN" b="1" dirty="0" smtClean="0"/>
-              <a:t>	</a:t>
-            </a:r>
-            <a:r>
               <a:rPr lang="en-US" altLang="zh-CN" dirty="0" smtClean="0"/>
-              <a:t>Stream&lt;T</a:t>
-            </a:r>
-            <a:r>
-              <a:rPr lang="en-US" altLang="zh-CN" dirty="0"/>
-              <a:t>&gt; filter(Predicate&lt;? </a:t>
-            </a:r>
-            <a:r>
-              <a:rPr lang="en-US" altLang="zh-CN" b="1" dirty="0"/>
-              <a:t>super </a:t>
-            </a:r>
-            <a:r>
-              <a:rPr lang="en-US" altLang="zh-CN" dirty="0"/>
-              <a:t>T&gt; predicate);</a:t>
-            </a:r>
-            <a:endParaRPr lang="zh-CN" altLang="en-US" dirty="0"/>
-          </a:p>
-          <a:p>
-            <a:endParaRPr lang="en-US" altLang="zh-CN" dirty="0"/>
-          </a:p>
-          <a:p>
-            <a:pPr marL="0" indent="0">
-              <a:buNone/>
-            </a:pPr>
-            <a:r>
-              <a:rPr lang="en-US" altLang="zh-CN" dirty="0"/>
               <a:t>}</a:t>
             </a:r>
             <a:endParaRPr lang="zh-CN" altLang="en-US" dirty="0"/>
@@ -8996,7 +9032,7 @@
           <a:p>
             <a:r>
               <a:rPr lang="en-US" altLang="zh-CN" dirty="0" smtClean="0"/>
-              <a:t>map</a:t>
+              <a:t>filter</a:t>
             </a:r>
             <a:endParaRPr lang="zh-CN" altLang="en-US" dirty="0"/>
           </a:p>
@@ -9018,41 +9054,14 @@
           <a:lstStyle/>
           <a:p>
             <a:r>
-              <a:rPr lang="en-US" altLang="zh-CN" dirty="0"/>
-              <a:t>Returns a stream consisting of the results of applying the given function to the elements of this stream. </a:t>
-            </a:r>
-            <a:endParaRPr lang="en-US" altLang="zh-CN" dirty="0" smtClean="0"/>
-          </a:p>
-          <a:p>
-            <a:endParaRPr lang="en-US" altLang="zh-CN" dirty="0"/>
+              <a:rPr lang="en-US" altLang="zh-CN" dirty="0" smtClean="0"/>
+              <a:t>Filter and process elements of a stream.</a:t>
+            </a:r>
           </a:p>
           <a:p>
             <a:pPr marL="0" indent="0">
               <a:buNone/>
             </a:pPr>
-            <a:r>
-              <a:rPr lang="en-US" altLang="zh-CN" b="1" dirty="0"/>
-              <a:t>public interface </a:t>
-            </a:r>
-            <a:r>
-              <a:rPr lang="en-US" altLang="zh-CN" dirty="0"/>
-              <a:t>Stream&lt;T&gt; </a:t>
-            </a:r>
-            <a:r>
-              <a:rPr lang="en-US" altLang="zh-CN" b="1" dirty="0"/>
-              <a:t>extends </a:t>
-            </a:r>
-            <a:r>
-              <a:rPr lang="en-US" altLang="zh-CN" dirty="0" err="1"/>
-              <a:t>BaseStream</a:t>
-            </a:r>
-            <a:r>
-              <a:rPr lang="en-US" altLang="zh-CN" dirty="0"/>
-              <a:t>&lt;T, Stream&lt;T&gt;&gt; { </a:t>
-            </a:r>
-            <a:endParaRPr lang="en-US" altLang="zh-CN" dirty="0"/>
-          </a:p>
-          <a:p>
             <a:endParaRPr lang="en-US" altLang="zh-CN" b="1" dirty="0"/>
           </a:p>
           <a:p>
@@ -9060,12 +9069,48 @@
               <a:buNone/>
             </a:pPr>
             <a:r>
+              <a:rPr lang="en-US" altLang="zh-CN" b="1" dirty="0" smtClean="0"/>
+              <a:t>public </a:t>
+            </a:r>
+            <a:r>
+              <a:rPr lang="en-US" altLang="zh-CN" b="1" dirty="0"/>
+              <a:t>interface </a:t>
+            </a:r>
+            <a:r>
+              <a:rPr lang="en-US" altLang="zh-CN" dirty="0"/>
+              <a:t>Stream&lt;T&gt; </a:t>
+            </a:r>
+            <a:r>
+              <a:rPr lang="en-US" altLang="zh-CN" b="1" dirty="0"/>
+              <a:t>extends </a:t>
+            </a:r>
+            <a:r>
+              <a:rPr lang="en-US" altLang="zh-CN" dirty="0" err="1"/>
+              <a:t>BaseStream</a:t>
+            </a:r>
+            <a:r>
+              <a:rPr lang="en-US" altLang="zh-CN" dirty="0"/>
+              <a:t>&lt;T, Stream&lt;T&gt;&gt; { </a:t>
+            </a:r>
+          </a:p>
+          <a:p>
+            <a:endParaRPr lang="en-US" altLang="zh-CN" b="1" dirty="0"/>
+          </a:p>
+          <a:p>
+            <a:pPr marL="0" indent="0">
+              <a:buNone/>
+            </a:pPr>
+            <a:r>
+              <a:rPr lang="en-US" altLang="zh-CN" b="1" dirty="0" smtClean="0"/>
+              <a:t>	</a:t>
+            </a:r>
+            <a:r>
               <a:rPr lang="en-US" altLang="zh-CN" dirty="0" smtClean="0"/>
-              <a:t>	&lt;</a:t>
+              <a:t>Stream&lt;T</a:t>
             </a:r>
             <a:r>
               <a:rPr lang="en-US" altLang="zh-CN" dirty="0"/>
-              <a:t>R&gt; Stream&lt;R&gt; map(Function&lt;? </a:t>
+              <a:t>&gt; filter(Predicate&lt;? </a:t>
             </a:r>
             <a:r>
               <a:rPr lang="en-US" altLang="zh-CN" b="1" dirty="0"/>
@@ -9073,15 +9118,7 @@
             </a:r>
             <a:r>
               <a:rPr lang="en-US" altLang="zh-CN" dirty="0"/>
-              <a:t>T, ? </a:t>
-            </a:r>
-            <a:r>
-              <a:rPr lang="en-US" altLang="zh-CN" b="1" dirty="0"/>
-              <a:t>extends </a:t>
-            </a:r>
-            <a:r>
-              <a:rPr lang="en-US" altLang="zh-CN" dirty="0"/>
-              <a:t>R&gt; mapper);</a:t>
+              <a:t>T&gt; predicate);</a:t>
             </a:r>
             <a:endParaRPr lang="zh-CN" altLang="en-US" dirty="0"/>
           </a:p>
@@ -9145,7 +9182,7 @@
           <a:p>
             <a:r>
               <a:rPr lang="en-US" altLang="zh-CN" dirty="0" smtClean="0"/>
-              <a:t>reduce</a:t>
+              <a:t>map</a:t>
             </a:r>
             <a:endParaRPr lang="zh-CN" altLang="en-US" dirty="0"/>
           </a:p>
@@ -9164,13 +9201,13 @@
         <p:spPr/>
         <p:txBody>
           <a:bodyPr>
-            <a:normAutofit fontScale="85000" lnSpcReduction="20000"/>
+            <a:normAutofit lnSpcReduction="10000"/>
           </a:bodyPr>
           <a:lstStyle/>
           <a:p>
             <a:r>
-              <a:rPr lang="en-US" altLang="zh-CN" dirty="0" err="1" smtClean="0"/>
-              <a:t>MapReduce</a:t>
+              <a:rPr lang="en-US" altLang="zh-CN" dirty="0"/>
+              <a:t>Returns a stream consisting of the results of applying the given function to the elements of this stream. </a:t>
             </a:r>
             <a:endParaRPr lang="en-US" altLang="zh-CN" dirty="0" smtClean="0"/>
           </a:p>
@@ -9201,7 +9238,6 @@
               <a:rPr lang="en-US" altLang="zh-CN" dirty="0"/>
               <a:t>&lt;T, Stream&lt;T&gt;&gt; { </a:t>
             </a:r>
-            <a:endParaRPr lang="en-US" altLang="zh-CN" dirty="0"/>
           </a:p>
           <a:p>
             <a:endParaRPr lang="en-US" altLang="zh-CN" b="1" dirty="0"/>
@@ -9212,104 +9248,28 @@
             </a:pPr>
             <a:r>
               <a:rPr lang="en-US" altLang="zh-CN" dirty="0" smtClean="0"/>
-              <a:t>	T </a:t>
+              <a:t>	&lt;</a:t>
             </a:r>
             <a:r>
               <a:rPr lang="en-US" altLang="zh-CN" dirty="0"/>
-              <a:t>reduce(T identity, </a:t>
-            </a:r>
-            <a:r>
-              <a:rPr lang="en-US" altLang="zh-CN" dirty="0" err="1"/>
-              <a:t>BinaryOperator</a:t>
+              <a:t>R&gt; Stream&lt;R&gt; map(Function&lt;? </a:t>
+            </a:r>
+            <a:r>
+              <a:rPr lang="en-US" altLang="zh-CN" b="1" dirty="0"/>
+              <a:t>super </a:t>
             </a:r>
             <a:r>
               <a:rPr lang="en-US" altLang="zh-CN" dirty="0"/>
-              <a:t>&lt;T&gt; accumulator</a:t>
-            </a:r>
-            <a:r>
-              <a:rPr lang="en-US" altLang="zh-CN" dirty="0" smtClean="0"/>
-              <a:t>);</a:t>
-            </a:r>
-            <a:endParaRPr lang="en-US" altLang="zh-CN" dirty="0" smtClean="0"/>
-          </a:p>
-          <a:p>
-            <a:pPr marL="0" indent="0">
-              <a:buNone/>
-            </a:pPr>
-            <a:r>
-              <a:rPr lang="en-US" altLang="zh-CN" dirty="0" smtClean="0"/>
-              <a:t>	Optional&lt;T</a:t>
+              <a:t>T, ? </a:t>
+            </a:r>
+            <a:r>
+              <a:rPr lang="en-US" altLang="zh-CN" b="1" dirty="0"/>
+              <a:t>extends </a:t>
             </a:r>
             <a:r>
               <a:rPr lang="en-US" altLang="zh-CN" dirty="0"/>
-              <a:t>&gt; reduce(</a:t>
-            </a:r>
-            <a:r>
-              <a:rPr lang="en-US" altLang="zh-CN" dirty="0" err="1"/>
-              <a:t>BinaryOperator</a:t>
-            </a:r>
-            <a:r>
-              <a:rPr lang="en-US" altLang="zh-CN" dirty="0"/>
-              <a:t>&lt;T&gt; accumulator);</a:t>
-            </a:r>
-            <a:endParaRPr lang="zh-CN" altLang="en-US" dirty="0"/>
-          </a:p>
-          <a:p>
-            <a:pPr marL="0" indent="0">
-              <a:buNone/>
-            </a:pPr>
-            <a:r>
-              <a:rPr lang="es-ES" altLang="zh-CN" dirty="0" smtClean="0"/>
-              <a:t>	&lt;</a:t>
-            </a:r>
-            <a:r>
-              <a:rPr lang="es-ES" altLang="zh-CN" dirty="0"/>
-              <a:t>U&gt; U reduce(U identity,</a:t>
-            </a:r>
-            <a:br>
-              <a:rPr lang="es-ES" altLang="zh-CN" dirty="0"/>
-            </a:br>
-            <a:r>
-              <a:rPr lang="es-ES" altLang="zh-CN" dirty="0"/>
-              <a:t>             </a:t>
-            </a:r>
-            <a:r>
-              <a:rPr lang="es-ES" altLang="zh-CN" dirty="0" smtClean="0"/>
-              <a:t>		BiFunction&lt;U</a:t>
-            </a:r>
-            <a:r>
-              <a:rPr lang="es-ES" altLang="zh-CN" dirty="0"/>
-              <a:t>, ? </a:t>
-            </a:r>
-            <a:r>
-              <a:rPr lang="es-ES" altLang="zh-CN" b="1" dirty="0"/>
-              <a:t>super </a:t>
-            </a:r>
-            <a:r>
-              <a:rPr lang="es-ES" altLang="zh-CN" dirty="0"/>
-              <a:t>T, U&gt; accumulator,</a:t>
-            </a:r>
-            <a:br>
-              <a:rPr lang="es-ES" altLang="zh-CN" dirty="0"/>
-            </a:br>
-            <a:r>
-              <a:rPr lang="es-ES" altLang="zh-CN" dirty="0"/>
-              <a:t>           </a:t>
-            </a:r>
-            <a:r>
-              <a:rPr lang="es-ES" altLang="zh-CN" dirty="0" smtClean="0"/>
-              <a:t>		BinaryOperator&lt;U</a:t>
-            </a:r>
-            <a:r>
-              <a:rPr lang="es-ES" altLang="zh-CN" dirty="0"/>
-              <a:t>&gt; combiner);</a:t>
-            </a:r>
-            <a:endParaRPr lang="zh-CN" altLang="en-US" dirty="0"/>
-          </a:p>
-          <a:p>
-            <a:pPr marL="0" indent="0">
-              <a:buNone/>
-            </a:pPr>
+              <a:t>R&gt; mapper);</a:t>
+            </a:r>
             <a:endParaRPr lang="zh-CN" altLang="en-US" dirty="0"/>
           </a:p>
           <a:p>
@@ -9378,6 +9338,231 @@
           </a:p>
         </p:txBody>
       </p:sp>
+      <p:sp>
+        <p:nvSpPr>
+          <p:cNvPr id="3" name="内容占位符 2"/>
+          <p:cNvSpPr>
+            <a:spLocks noGrp="1"/>
+          </p:cNvSpPr>
+          <p:nvPr>
+            <p:ph idx="1"/>
+          </p:nvPr>
+        </p:nvSpPr>
+        <p:spPr/>
+        <p:txBody>
+          <a:bodyPr>
+            <a:normAutofit fontScale="85000" lnSpcReduction="20000"/>
+          </a:bodyPr>
+          <a:lstStyle/>
+          <a:p>
+            <a:r>
+              <a:rPr lang="en-US" altLang="zh-CN" dirty="0" err="1" smtClean="0"/>
+              <a:t>MapReduce</a:t>
+            </a:r>
+            <a:endParaRPr lang="en-US" altLang="zh-CN" dirty="0" smtClean="0"/>
+          </a:p>
+          <a:p>
+            <a:endParaRPr lang="en-US" altLang="zh-CN" dirty="0"/>
+          </a:p>
+          <a:p>
+            <a:pPr marL="0" indent="0">
+              <a:buNone/>
+            </a:pPr>
+            <a:r>
+              <a:rPr lang="en-US" altLang="zh-CN" b="1" dirty="0"/>
+              <a:t>public interface </a:t>
+            </a:r>
+            <a:r>
+              <a:rPr lang="en-US" altLang="zh-CN" dirty="0"/>
+              <a:t>Stream&lt;T&gt; </a:t>
+            </a:r>
+            <a:r>
+              <a:rPr lang="en-US" altLang="zh-CN" b="1" dirty="0"/>
+              <a:t>extends </a:t>
+            </a:r>
+            <a:r>
+              <a:rPr lang="en-US" altLang="zh-CN" dirty="0" err="1"/>
+              <a:t>BaseStream</a:t>
+            </a:r>
+            <a:r>
+              <a:rPr lang="en-US" altLang="zh-CN" dirty="0"/>
+              <a:t>&lt;T, Stream&lt;T&gt;&gt; { </a:t>
+            </a:r>
+          </a:p>
+          <a:p>
+            <a:endParaRPr lang="en-US" altLang="zh-CN" b="1" dirty="0"/>
+          </a:p>
+          <a:p>
+            <a:pPr marL="0" indent="0">
+              <a:buNone/>
+            </a:pPr>
+            <a:r>
+              <a:rPr lang="en-US" altLang="zh-CN" dirty="0" smtClean="0"/>
+              <a:t>	T </a:t>
+            </a:r>
+            <a:r>
+              <a:rPr lang="en-US" altLang="zh-CN" dirty="0"/>
+              <a:t>reduce(T identity, </a:t>
+            </a:r>
+            <a:r>
+              <a:rPr lang="en-US" altLang="zh-CN" dirty="0" err="1"/>
+              <a:t>BinaryOperator</a:t>
+            </a:r>
+            <a:r>
+              <a:rPr lang="en-US" altLang="zh-CN" dirty="0"/>
+              <a:t>&lt;T&gt; accumulator</a:t>
+            </a:r>
+            <a:r>
+              <a:rPr lang="en-US" altLang="zh-CN" dirty="0" smtClean="0"/>
+              <a:t>);</a:t>
+            </a:r>
+          </a:p>
+          <a:p>
+            <a:pPr marL="0" indent="0">
+              <a:buNone/>
+            </a:pPr>
+            <a:r>
+              <a:rPr lang="en-US" altLang="zh-CN" dirty="0" smtClean="0"/>
+              <a:t>	Optional&lt;T</a:t>
+            </a:r>
+            <a:r>
+              <a:rPr lang="en-US" altLang="zh-CN" dirty="0"/>
+              <a:t>&gt; reduce(</a:t>
+            </a:r>
+            <a:r>
+              <a:rPr lang="en-US" altLang="zh-CN" dirty="0" err="1"/>
+              <a:t>BinaryOperator</a:t>
+            </a:r>
+            <a:r>
+              <a:rPr lang="en-US" altLang="zh-CN" dirty="0"/>
+              <a:t>&lt;T&gt; accumulator);</a:t>
+            </a:r>
+            <a:endParaRPr lang="zh-CN" altLang="en-US" dirty="0"/>
+          </a:p>
+          <a:p>
+            <a:pPr marL="0" indent="0">
+              <a:buNone/>
+            </a:pPr>
+            <a:r>
+              <a:rPr lang="es-ES" altLang="zh-CN" dirty="0" smtClean="0"/>
+              <a:t>	&lt;</a:t>
+            </a:r>
+            <a:r>
+              <a:rPr lang="es-ES" altLang="zh-CN" dirty="0"/>
+              <a:t>U&gt; U reduce(U identity,</a:t>
+            </a:r>
+            <a:br>
+              <a:rPr lang="es-ES" altLang="zh-CN" dirty="0"/>
+            </a:br>
+            <a:r>
+              <a:rPr lang="es-ES" altLang="zh-CN" dirty="0"/>
+              <a:t>             </a:t>
+            </a:r>
+            <a:r>
+              <a:rPr lang="es-ES" altLang="zh-CN" dirty="0" smtClean="0"/>
+              <a:t>		BiFunction&lt;U</a:t>
+            </a:r>
+            <a:r>
+              <a:rPr lang="es-ES" altLang="zh-CN" dirty="0"/>
+              <a:t>, ? </a:t>
+            </a:r>
+            <a:r>
+              <a:rPr lang="es-ES" altLang="zh-CN" b="1" dirty="0"/>
+              <a:t>super </a:t>
+            </a:r>
+            <a:r>
+              <a:rPr lang="es-ES" altLang="zh-CN" dirty="0"/>
+              <a:t>T, U&gt; accumulator,</a:t>
+            </a:r>
+            <a:br>
+              <a:rPr lang="es-ES" altLang="zh-CN" dirty="0"/>
+            </a:br>
+            <a:r>
+              <a:rPr lang="es-ES" altLang="zh-CN" dirty="0"/>
+              <a:t>           </a:t>
+            </a:r>
+            <a:r>
+              <a:rPr lang="es-ES" altLang="zh-CN" dirty="0" smtClean="0"/>
+              <a:t>		BinaryOperator&lt;U</a:t>
+            </a:r>
+            <a:r>
+              <a:rPr lang="es-ES" altLang="zh-CN" dirty="0"/>
+              <a:t>&gt; combiner);</a:t>
+            </a:r>
+            <a:endParaRPr lang="zh-CN" altLang="en-US" dirty="0"/>
+          </a:p>
+          <a:p>
+            <a:pPr marL="0" indent="0">
+              <a:buNone/>
+            </a:pPr>
+            <a:endParaRPr lang="zh-CN" altLang="en-US" dirty="0"/>
+          </a:p>
+          <a:p>
+            <a:endParaRPr lang="en-US" altLang="zh-CN" dirty="0"/>
+          </a:p>
+          <a:p>
+            <a:pPr marL="0" indent="0">
+              <a:buNone/>
+            </a:pPr>
+            <a:r>
+              <a:rPr lang="en-US" altLang="zh-CN" dirty="0"/>
+              <a:t>}</a:t>
+            </a:r>
+            <a:endParaRPr lang="zh-CN" altLang="en-US" dirty="0"/>
+          </a:p>
+          <a:p>
+            <a:endParaRPr lang="zh-CN" altLang="en-US" dirty="0"/>
+          </a:p>
+        </p:txBody>
+      </p:sp>
+    </p:spTree>
+  </p:cSld>
+  <p:clrMapOvr>
+    <a:masterClrMapping/>
+  </p:clrMapOvr>
+</p:sld>
+</file>
+
+<file path=ppt/slides/slide27.xml><?xml version="1.0" encoding="utf-8"?>
+<p:sld xmlns:a="http://schemas.openxmlformats.org/drawingml/2006/main" xmlns:r="http://schemas.openxmlformats.org/officeDocument/2006/relationships" xmlns:p="http://schemas.openxmlformats.org/presentationml/2006/main">
+  <p:cSld>
+    <p:spTree>
+      <p:nvGrpSpPr>
+        <p:cNvPr id="1" name=""/>
+        <p:cNvGrpSpPr/>
+        <p:nvPr/>
+      </p:nvGrpSpPr>
+      <p:grpSpPr>
+        <a:xfrm>
+          <a:off x="0" y="0"/>
+          <a:ext cx="0" cy="0"/>
+          <a:chOff x="0" y="0"/>
+          <a:chExt cx="0" cy="0"/>
+        </a:xfrm>
+      </p:grpSpPr>
+      <p:sp>
+        <p:nvSpPr>
+          <p:cNvPr id="2" name="标题 1"/>
+          <p:cNvSpPr>
+            <a:spLocks noGrp="1"/>
+          </p:cNvSpPr>
+          <p:nvPr>
+            <p:ph type="title"/>
+          </p:nvPr>
+        </p:nvSpPr>
+        <p:spPr/>
+        <p:txBody>
+          <a:bodyPr/>
+          <a:lstStyle/>
+          <a:p>
+            <a:r>
+              <a:rPr lang="en-US" altLang="zh-CN" dirty="0" smtClean="0"/>
+              <a:t>reduce</a:t>
+            </a:r>
+            <a:endParaRPr lang="zh-CN" altLang="en-US" dirty="0"/>
+          </a:p>
+        </p:txBody>
+      </p:sp>
       <p:pic>
         <p:nvPicPr>
           <p:cNvPr id="4" name="内容占位符 3"/>
@@ -9389,7 +9574,7 @@
           </p:nvPr>
         </p:nvPicPr>
         <p:blipFill>
-          <a:blip r:embed="rId1">
+          <a:blip r:embed="rId3">
             <a:extLst>
               <a:ext uri="{28A0092B-C50C-407E-A947-70E740481C1C}">
                 <a14:useLocalDpi xmlns:a14="http://schemas.microsoft.com/office/drawing/2010/main" val="0"/>
@@ -9415,7 +9600,7 @@
 </p:sld>
 </file>
 
-<file path=ppt/slides/slide27.xml><?xml version="1.0" encoding="utf-8"?>
+<file path=ppt/slides/slide28.xml><?xml version="1.0" encoding="utf-8"?>
 <p:sld xmlns:a="http://schemas.openxmlformats.org/drawingml/2006/main" xmlns:r="http://schemas.openxmlformats.org/officeDocument/2006/relationships" xmlns:p="http://schemas.openxmlformats.org/presentationml/2006/main">
   <p:cSld>
     <p:spTree>
@@ -9474,7 +9659,6 @@
               <a:rPr lang="en-US" altLang="zh-CN"/>
               <a:t>collect data from stream to a List, Set or Map</a:t>
             </a:r>
-            <a:endParaRPr lang="en-US" altLang="zh-CN"/>
           </a:p>
         </p:txBody>
       </p:sp>
@@ -9486,7 +9670,7 @@
 </p:sld>
 </file>
 
-<file path=ppt/slides/slide28.xml><?xml version="1.0" encoding="utf-8"?>
+<file path=ppt/slides/slide29.xml><?xml version="1.0" encoding="utf-8"?>
 <p:sld xmlns:a="http://schemas.openxmlformats.org/drawingml/2006/main" xmlns:r="http://schemas.openxmlformats.org/officeDocument/2006/relationships" xmlns:p="http://schemas.openxmlformats.org/presentationml/2006/main">
   <p:cSld>
     <p:spTree>
@@ -9495,7 +9679,14 @@
         <p:cNvGrpSpPr/>
         <p:nvPr/>
       </p:nvGrpSpPr>
-      <p:grpSpPr/>
+      <p:grpSpPr>
+        <a:xfrm>
+          <a:off x="0" y="0"/>
+          <a:ext cx="0" cy="0"/>
+          <a:chOff x="0" y="0"/>
+          <a:chExt cx="0" cy="0"/>
+        </a:xfrm>
+      </p:grpSpPr>
       <p:sp>
         <p:nvSpPr>
           <p:cNvPr id="2" name="标题 1"/>
@@ -9509,19 +9700,21 @@
         <p:spPr/>
         <p:txBody>
           <a:bodyPr/>
+          <a:lstStyle/>
           <a:p>
             <a:r>
               <a:rPr lang="en-US" altLang="zh-CN"/>
               <a:t>peek</a:t>
             </a:r>
-            <a:endParaRPr lang="en-US" altLang="zh-CN"/>
           </a:p>
         </p:txBody>
       </p:sp>
       <p:sp>
         <p:nvSpPr>
           <p:cNvPr id="5" name="内容占位符 4"/>
-          <p:cNvSpPr/>
+          <p:cNvSpPr>
+            <a:spLocks noGrp="1"/>
+          </p:cNvSpPr>
           <p:nvPr>
             <p:ph idx="1"/>
           </p:nvPr>
@@ -9529,12 +9722,12 @@
         <p:spPr/>
         <p:txBody>
           <a:bodyPr/>
+          <a:lstStyle/>
           <a:p>
             <a:r>
               <a:rPr lang="en-US" altLang="zh-CN"/>
               <a:t>for debugging </a:t>
             </a:r>
-            <a:endParaRPr lang="en-US" altLang="zh-CN"/>
           </a:p>
         </p:txBody>
       </p:sp>
@@ -9547,7 +9740,7 @@
           <p:nvPr/>
         </p:nvPicPr>
         <p:blipFill>
-          <a:blip r:embed="rId1"/>
+          <a:blip r:embed="rId3"/>
           <a:stretch>
             <a:fillRect/>
           </a:stretch>
@@ -9604,7 +9797,7 @@
           <a:p>
             <a:r>
               <a:rPr lang="en-US" altLang="zh-CN" dirty="0" smtClean="0"/>
-              <a:t>OOD Principle</a:t>
+              <a:t>Programming Paradigm</a:t>
             </a:r>
             <a:endParaRPr lang="zh-CN" altLang="en-US" dirty="0"/>
           </a:p>
@@ -9627,56 +9820,25 @@
           <a:p>
             <a:r>
               <a:rPr lang="en-US" altLang="zh-CN" dirty="0" smtClean="0"/>
-              <a:t>Single responsibility principle</a:t>
-            </a:r>
+              <a:t>Function Programming Paradigm</a:t>
+            </a:r>
+          </a:p>
+          <a:p>
             <a:endParaRPr lang="en-US" altLang="zh-CN" dirty="0" smtClean="0"/>
           </a:p>
           <a:p>
             <a:r>
               <a:rPr lang="en-US" altLang="zh-CN" dirty="0" smtClean="0"/>
-              <a:t>Open close principle</a:t>
-            </a:r>
+              <a:t>Object Oriented Programming Paradigm</a:t>
+            </a:r>
+          </a:p>
+          <a:p>
             <a:endParaRPr lang="en-US" altLang="zh-CN" dirty="0" smtClean="0"/>
           </a:p>
           <a:p>
             <a:r>
-              <a:rPr lang="en-US" altLang="zh-CN" dirty="0" err="1" smtClean="0"/>
-              <a:t>Liskov</a:t>
-            </a:r>
-            <a:r>
               <a:rPr lang="en-US" altLang="zh-CN" dirty="0" smtClean="0"/>
-              <a:t> substitution principle</a:t>
-            </a:r>
-            <a:endParaRPr lang="en-US" altLang="zh-CN" dirty="0" smtClean="0"/>
-          </a:p>
-          <a:p>
-            <a:r>
-              <a:rPr lang="en-US" altLang="zh-CN" dirty="0" smtClean="0"/>
-              <a:t>Interface Segregation principle</a:t>
-            </a:r>
-            <a:endParaRPr lang="en-US" altLang="zh-CN" dirty="0" smtClean="0"/>
-          </a:p>
-          <a:p>
-            <a:r>
-              <a:rPr lang="en-US" altLang="zh-CN" dirty="0" smtClean="0"/>
-              <a:t>Dependency Inversion principle</a:t>
-            </a:r>
-            <a:endParaRPr lang="en-US" altLang="zh-CN" dirty="0" smtClean="0"/>
-          </a:p>
-          <a:p>
-            <a:endParaRPr lang="en-US" altLang="zh-CN" dirty="0"/>
-          </a:p>
-          <a:p>
-            <a:r>
-              <a:rPr lang="en-US" altLang="zh-CN" dirty="0" smtClean="0"/>
-              <a:t>Law of Demeter</a:t>
-            </a:r>
-            <a:endParaRPr lang="en-US" altLang="zh-CN" dirty="0" smtClean="0"/>
-          </a:p>
-          <a:p>
-            <a:r>
-              <a:rPr lang="en-US" altLang="zh-CN" dirty="0" smtClean="0"/>
-              <a:t>CARP</a:t>
+              <a:t>Aspect Oriented Programming Paradigm</a:t>
             </a:r>
             <a:endParaRPr lang="zh-CN" altLang="en-US" dirty="0"/>
           </a:p>
@@ -9754,9 +9916,36 @@
           <a:p>
             <a:r>
               <a:rPr lang="en-US" altLang="zh-CN" dirty="0" smtClean="0"/>
-              <a:t>If we follow all the principles of OOD, we would get MANY interfaces only have one method. We DO NOT like it.</a:t>
-            </a:r>
-            <a:endParaRPr lang="en-US" altLang="zh-CN" dirty="0" smtClean="0"/>
+              <a:t>Single responsibility principle</a:t>
+            </a:r>
+          </a:p>
+          <a:p>
+            <a:r>
+              <a:rPr lang="en-US" altLang="zh-CN" dirty="0" smtClean="0"/>
+              <a:t>Open close principle</a:t>
+            </a:r>
+          </a:p>
+          <a:p>
+            <a:r>
+              <a:rPr lang="en-US" altLang="zh-CN" dirty="0" err="1" smtClean="0"/>
+              <a:t>Liskov</a:t>
+            </a:r>
+            <a:r>
+              <a:rPr lang="en-US" altLang="zh-CN" dirty="0" smtClean="0"/>
+              <a:t> substitution principle</a:t>
+            </a:r>
+          </a:p>
+          <a:p>
+            <a:r>
+              <a:rPr lang="en-US" altLang="zh-CN" dirty="0" smtClean="0"/>
+              <a:t>Interface Segregation principle</a:t>
+            </a:r>
+          </a:p>
+          <a:p>
+            <a:r>
+              <a:rPr lang="en-US" altLang="zh-CN" dirty="0" smtClean="0"/>
+              <a:t>Dependency Inversion principle</a:t>
+            </a:r>
           </a:p>
           <a:p>
             <a:endParaRPr lang="en-US" altLang="zh-CN" dirty="0"/>
@@ -9764,29 +9953,15 @@
           <a:p>
             <a:r>
               <a:rPr lang="en-US" altLang="zh-CN" dirty="0" smtClean="0"/>
-              <a:t>We could wrap them with function.</a:t>
-            </a:r>
-            <a:r>
-              <a:rPr lang="en-US" altLang="zh-CN" dirty="0" smtClean="0">
-                <a:solidFill>
-                  <a:srgbClr val="FF0000"/>
-                </a:solidFill>
-              </a:rPr>
-              <a:t>? </a:t>
-            </a:r>
-            <a:r>
-              <a:rPr lang="zh-CN" altLang="en-US" dirty="0" smtClean="0">
-                <a:solidFill>
-                  <a:srgbClr val="FF0000"/>
-                </a:solidFill>
-              </a:rPr>
-              <a:t>不懂</a:t>
-            </a:r>
-            <a:endParaRPr lang="zh-CN" altLang="en-US" dirty="0">
-              <a:solidFill>
-                <a:srgbClr val="FF0000"/>
-              </a:solidFill>
-            </a:endParaRPr>
+              <a:t>Law of Demeter</a:t>
+            </a:r>
+          </a:p>
+          <a:p>
+            <a:r>
+              <a:rPr lang="en-US" altLang="zh-CN" dirty="0" smtClean="0"/>
+              <a:t>CARP</a:t>
+            </a:r>
+            <a:endParaRPr lang="zh-CN" altLang="en-US" dirty="0"/>
           </a:p>
         </p:txBody>
       </p:sp>
@@ -9839,7 +10014,7 @@
           <a:p>
             <a:r>
               <a:rPr lang="en-US" altLang="zh-CN" dirty="0" smtClean="0"/>
-              <a:t>Function first</a:t>
+              <a:t>OOD Principle</a:t>
             </a:r>
             <a:endParaRPr lang="zh-CN" altLang="en-US" dirty="0"/>
           </a:p>
@@ -9862,9 +10037,38 @@
           <a:p>
             <a:r>
               <a:rPr lang="en-US" altLang="zh-CN" dirty="0" smtClean="0"/>
-              <a:t>Function can be the return value of another function</a:t>
-            </a:r>
-            <a:endParaRPr lang="zh-CN" altLang="en-US" dirty="0"/>
+              <a:t>If we follow all the principles of OOD, we would get MANY interfaces only have one method. We DO NOT like it.</a:t>
+            </a:r>
+          </a:p>
+          <a:p>
+            <a:endParaRPr lang="en-US" altLang="zh-CN" dirty="0"/>
+          </a:p>
+          <a:p>
+            <a:r>
+              <a:rPr lang="en-US" altLang="zh-CN" dirty="0" smtClean="0"/>
+              <a:t>We could wrap them with function.</a:t>
+            </a:r>
+            <a:r>
+              <a:rPr lang="en-US" altLang="zh-CN" dirty="0" smtClean="0">
+                <a:solidFill>
+                  <a:srgbClr val="FF0000"/>
+                </a:solidFill>
+              </a:rPr>
+              <a:t>? </a:t>
+            </a:r>
+            <a:r>
+              <a:rPr lang="zh-CN" altLang="en-US" dirty="0" smtClean="0">
+                <a:solidFill>
+                  <a:srgbClr val="FF0000"/>
+                </a:solidFill>
+              </a:rPr>
+              <a:t>不懂</a:t>
+            </a:r>
+            <a:endParaRPr lang="zh-CN" altLang="en-US" dirty="0">
+              <a:solidFill>
+                <a:srgbClr val="FF0000"/>
+              </a:solidFill>
+            </a:endParaRPr>
           </a:p>
         </p:txBody>
       </p:sp>
@@ -9917,7 +10121,7 @@
           <a:p>
             <a:r>
               <a:rPr lang="en-US" altLang="zh-CN" dirty="0" smtClean="0"/>
-              <a:t>No side effect</a:t>
+              <a:t>Function first</a:t>
             </a:r>
             <a:endParaRPr lang="zh-CN" altLang="en-US" dirty="0"/>
           </a:p>
@@ -9940,11 +10144,8 @@
           <a:p>
             <a:r>
               <a:rPr lang="en-US" altLang="zh-CN" dirty="0" smtClean="0"/>
-              <a:t>Side effect means it won’t change the outer state, such as a global variants.</a:t>
-            </a:r>
-            <a:endParaRPr lang="en-US" altLang="zh-CN" dirty="0" smtClean="0"/>
-          </a:p>
-          <a:p>
+              <a:t>Function can be the return value of another function</a:t>
+            </a:r>
             <a:endParaRPr lang="zh-CN" altLang="en-US" dirty="0"/>
           </a:p>
         </p:txBody>
@@ -9998,62 +10199,37 @@
           <a:p>
             <a:r>
               <a:rPr lang="en-US" altLang="zh-CN" dirty="0" smtClean="0"/>
-              <a:t>Declarative &amp; Imperative Programming</a:t>
+              <a:t>No side effect</a:t>
             </a:r>
             <a:endParaRPr lang="zh-CN" altLang="en-US" dirty="0"/>
           </a:p>
         </p:txBody>
       </p:sp>
-      <p:pic>
-        <p:nvPicPr>
-          <p:cNvPr id="5" name="内容占位符 4"/>
-          <p:cNvPicPr>
-            <a:picLocks noGrp="1" noChangeAspect="1"/>
-          </p:cNvPicPr>
+      <p:sp>
+        <p:nvSpPr>
+          <p:cNvPr id="3" name="内容占位符 2"/>
+          <p:cNvSpPr>
+            <a:spLocks noGrp="1"/>
+          </p:cNvSpPr>
           <p:nvPr>
             <p:ph idx="1"/>
           </p:nvPr>
-        </p:nvPicPr>
-        <p:blipFill>
-          <a:blip r:embed="rId1"/>
-          <a:stretch>
-            <a:fillRect/>
-          </a:stretch>
-        </p:blipFill>
-        <p:spPr>
-          <a:xfrm>
-            <a:off x="838199" y="4740625"/>
-            <a:ext cx="6739813" cy="1350463"/>
-          </a:xfrm>
-          <a:prstGeom prst="rect">
-            <a:avLst/>
-          </a:prstGeom>
-        </p:spPr>
-      </p:pic>
-      <p:pic>
-        <p:nvPicPr>
-          <p:cNvPr id="4" name="图片 3"/>
-          <p:cNvPicPr>
-            <a:picLocks noChangeAspect="1"/>
-          </p:cNvPicPr>
-          <p:nvPr/>
-        </p:nvPicPr>
-        <p:blipFill>
-          <a:blip r:embed="rId2"/>
-          <a:stretch>
-            <a:fillRect/>
-          </a:stretch>
-        </p:blipFill>
-        <p:spPr>
-          <a:xfrm>
-            <a:off x="838199" y="1825625"/>
-            <a:ext cx="6741651" cy="1964710"/>
-          </a:xfrm>
-          <a:prstGeom prst="rect">
-            <a:avLst/>
-          </a:prstGeom>
-        </p:spPr>
-      </p:pic>
+        </p:nvSpPr>
+        <p:spPr/>
+        <p:txBody>
+          <a:bodyPr/>
+          <a:lstStyle/>
+          <a:p>
+            <a:r>
+              <a:rPr lang="en-US" altLang="zh-CN" dirty="0" smtClean="0"/>
+              <a:t>Side effect means it won’t change the outer state, such as a global variants.</a:t>
+            </a:r>
+          </a:p>
+          <a:p>
+            <a:endParaRPr lang="zh-CN" altLang="en-US" dirty="0"/>
+          </a:p>
+        </p:txBody>
+      </p:sp>
     </p:spTree>
   </p:cSld>
   <p:clrMapOvr>
@@ -10102,51 +10278,63 @@
           <a:lstStyle/>
           <a:p>
             <a:r>
-              <a:rPr lang="zh-CN" altLang="en-US" dirty="0" smtClean="0"/>
-              <a:t>尾递归优化</a:t>
+              <a:rPr lang="en-US" altLang="zh-CN" dirty="0" smtClean="0"/>
+              <a:t>Declarative &amp; Imperative Programming</a:t>
             </a:r>
             <a:endParaRPr lang="zh-CN" altLang="en-US" dirty="0"/>
           </a:p>
         </p:txBody>
       </p:sp>
-      <p:sp>
-        <p:nvSpPr>
-          <p:cNvPr id="3" name="内容占位符 2"/>
-          <p:cNvSpPr>
-            <a:spLocks noGrp="1"/>
-          </p:cNvSpPr>
+      <p:pic>
+        <p:nvPicPr>
+          <p:cNvPr id="5" name="内容占位符 4"/>
+          <p:cNvPicPr>
+            <a:picLocks noGrp="1" noChangeAspect="1"/>
+          </p:cNvPicPr>
           <p:nvPr>
             <p:ph idx="1"/>
           </p:nvPr>
-        </p:nvSpPr>
-        <p:spPr/>
-        <p:txBody>
-          <a:bodyPr/>
-          <a:lstStyle/>
-          <a:p>
-            <a:r>
-              <a:rPr lang="en-US" altLang="zh-CN" dirty="0" smtClean="0"/>
-              <a:t>Disadvantage of recursion programming: it may cause </a:t>
-            </a:r>
-            <a:r>
-              <a:rPr lang="en-US" altLang="zh-CN" dirty="0" err="1" smtClean="0"/>
-              <a:t>stackOverflow</a:t>
-            </a:r>
-            <a:r>
-              <a:rPr lang="en-US" altLang="zh-CN" dirty="0" smtClean="0"/>
-              <a:t>.</a:t>
-            </a:r>
-            <a:endParaRPr lang="en-US" altLang="zh-CN" dirty="0" smtClean="0"/>
-          </a:p>
-          <a:p>
-            <a:r>
-              <a:rPr lang="zh-CN" altLang="en-US" dirty="0" smtClean="0"/>
-              <a:t>尾递归优化可以很好解决这个问题。</a:t>
-            </a:r>
-            <a:endParaRPr lang="en-US" altLang="zh-CN" dirty="0" smtClean="0"/>
-          </a:p>
-        </p:txBody>
-      </p:sp>
+        </p:nvPicPr>
+        <p:blipFill>
+          <a:blip r:embed="rId3"/>
+          <a:stretch>
+            <a:fillRect/>
+          </a:stretch>
+        </p:blipFill>
+        <p:spPr>
+          <a:xfrm>
+            <a:off x="838199" y="4740625"/>
+            <a:ext cx="6739813" cy="1350463"/>
+          </a:xfrm>
+          <a:prstGeom prst="rect">
+            <a:avLst/>
+          </a:prstGeom>
+        </p:spPr>
+      </p:pic>
+      <p:pic>
+        <p:nvPicPr>
+          <p:cNvPr id="4" name="图片 3"/>
+          <p:cNvPicPr>
+            <a:picLocks noChangeAspect="1"/>
+          </p:cNvPicPr>
+          <p:nvPr/>
+        </p:nvPicPr>
+        <p:blipFill>
+          <a:blip r:embed="rId4"/>
+          <a:stretch>
+            <a:fillRect/>
+          </a:stretch>
+        </p:blipFill>
+        <p:spPr>
+          <a:xfrm>
+            <a:off x="838199" y="1825625"/>
+            <a:ext cx="6741651" cy="1964710"/>
+          </a:xfrm>
+          <a:prstGeom prst="rect">
+            <a:avLst/>
+          </a:prstGeom>
+        </p:spPr>
+      </p:pic>
     </p:spTree>
   </p:cSld>
   <p:clrMapOvr>
@@ -10195,65 +10383,50 @@
           <a:lstStyle/>
           <a:p>
             <a:r>
+              <a:rPr lang="zh-CN" altLang="en-US" dirty="0" smtClean="0"/>
+              <a:t>尾递归优化</a:t>
+            </a:r>
+            <a:endParaRPr lang="zh-CN" altLang="en-US" dirty="0"/>
+          </a:p>
+        </p:txBody>
+      </p:sp>
+      <p:sp>
+        <p:nvSpPr>
+          <p:cNvPr id="3" name="内容占位符 2"/>
+          <p:cNvSpPr>
+            <a:spLocks noGrp="1"/>
+          </p:cNvSpPr>
+          <p:nvPr>
+            <p:ph idx="1"/>
+          </p:nvPr>
+        </p:nvSpPr>
+        <p:spPr/>
+        <p:txBody>
+          <a:bodyPr/>
+          <a:lstStyle/>
+          <a:p>
+            <a:r>
               <a:rPr lang="en-US" altLang="zh-CN" dirty="0" smtClean="0"/>
-              <a:t>Immutable Pattern</a:t>
-            </a:r>
-            <a:endParaRPr lang="zh-CN" altLang="en-US" dirty="0"/>
-          </a:p>
-        </p:txBody>
-      </p:sp>
-      <p:sp>
-        <p:nvSpPr>
-          <p:cNvPr id="3" name="内容占位符 2"/>
-          <p:cNvSpPr>
-            <a:spLocks noGrp="1"/>
-          </p:cNvSpPr>
-          <p:nvPr>
-            <p:ph idx="1"/>
-          </p:nvPr>
-        </p:nvSpPr>
-        <p:spPr>
-          <a:xfrm>
-            <a:off x="838200" y="4293982"/>
-            <a:ext cx="10515600" cy="1959334"/>
-          </a:xfrm>
-        </p:spPr>
-        <p:txBody>
-          <a:bodyPr/>
-          <a:lstStyle/>
-          <a:p>
+              <a:t>Disadvantage of recursion programming: it may cause </a:t>
+            </a:r>
+            <a:r>
+              <a:rPr lang="en-US" altLang="zh-CN" dirty="0" err="1" smtClean="0"/>
+              <a:t>stackOverflow</a:t>
+            </a:r>
             <a:r>
               <a:rPr lang="en-US" altLang="zh-CN" dirty="0" smtClean="0"/>
-              <a:t>For it is immutable, then it’s easy to run parallel</a:t>
-            </a:r>
-            <a:endParaRPr lang="zh-CN" altLang="en-US" dirty="0"/>
-          </a:p>
-        </p:txBody>
-      </p:sp>
-      <p:pic>
-        <p:nvPicPr>
-          <p:cNvPr id="4" name="图片 3"/>
-          <p:cNvPicPr>
-            <a:picLocks noChangeAspect="1"/>
-          </p:cNvPicPr>
-          <p:nvPr/>
-        </p:nvPicPr>
-        <p:blipFill>
-          <a:blip r:embed="rId1"/>
-          <a:stretch>
-            <a:fillRect/>
-          </a:stretch>
-        </p:blipFill>
-        <p:spPr>
-          <a:xfrm>
-            <a:off x="838200" y="1825625"/>
-            <a:ext cx="10139706" cy="2333420"/>
-          </a:xfrm>
-          <a:prstGeom prst="rect">
-            <a:avLst/>
-          </a:prstGeom>
-        </p:spPr>
-      </p:pic>
+              <a:t>.</a:t>
+            </a:r>
+          </a:p>
+          <a:p>
+            <a:r>
+              <a:rPr lang="zh-CN" altLang="en-US" dirty="0" smtClean="0"/>
+              <a:t>尾递归优化可以很好解决这个问题。</a:t>
+            </a:r>
+            <a:endParaRPr lang="en-US" altLang="zh-CN" dirty="0" smtClean="0"/>
+          </a:p>
+        </p:txBody>
+      </p:sp>
     </p:spTree>
   </p:cSld>
   <p:clrMapOvr>
@@ -10520,6 +10693,8 @@
       </a:bgFillStyleLst>
     </a:fmtScheme>
   </a:themeElements>
+  <a:objectDefaults/>
+  <a:extraClrSchemeLst/>
   <a:extLst>
     <a:ext uri="{05A4C25C-085E-4340-85A3-A5531E510DB2}">
       <thm15:themeFamily xmlns:thm15="http://schemas.microsoft.com/office/thememl/2012/main" name="Office Theme" id="{62F939B6-93AF-4DB8-9C6B-D6C7DFDC589F}" vid="{4A3C46E8-61CC-4603-A589-7422A47A8E4A}"/>
@@ -10779,6 +10954,8 @@
       </a:bgFillStyleLst>
     </a:fmtScheme>
   </a:themeElements>
+  <a:objectDefaults/>
+  <a:extraClrSchemeLst/>
   <a:extLst>
     <a:ext uri="{05A4C25C-085E-4340-85A3-A5531E510DB2}">
       <thm15:themeFamily xmlns:thm15="http://schemas.microsoft.com/office/thememl/2012/main" name="Office Theme" id="{62F939B6-93AF-4DB8-9C6B-D6C7DFDC589F}" vid="{4A3C46E8-61CC-4603-A589-7422A47A8E4A}"/>

</xml_diff>